<commit_message>
Code refactoring and update presentation
</commit_message>
<xml_diff>
--- a/NSI - C++.pptx
+++ b/NSI - C++.pptx
@@ -39,14 +39,15 @@
     <p:sldId id="287" r:id="rId33"/>
     <p:sldId id="288" r:id="rId34"/>
     <p:sldId id="292" r:id="rId35"/>
-    <p:sldId id="289" r:id="rId36"/>
-    <p:sldId id="290" r:id="rId37"/>
-    <p:sldId id="291" r:id="rId38"/>
-    <p:sldId id="293" r:id="rId39"/>
-    <p:sldId id="294" r:id="rId40"/>
-    <p:sldId id="295" r:id="rId41"/>
-    <p:sldId id="296" r:id="rId42"/>
-    <p:sldId id="297" r:id="rId43"/>
+    <p:sldId id="298" r:id="rId36"/>
+    <p:sldId id="289" r:id="rId37"/>
+    <p:sldId id="290" r:id="rId38"/>
+    <p:sldId id="291" r:id="rId39"/>
+    <p:sldId id="293" r:id="rId40"/>
+    <p:sldId id="294" r:id="rId41"/>
+    <p:sldId id="295" r:id="rId42"/>
+    <p:sldId id="296" r:id="rId43"/>
+    <p:sldId id="297" r:id="rId44"/>
   </p:sldIdLst>
   <p:sldSz cx="12192000" cy="6858000"/>
   <p:notesSz cx="6858000" cy="9144000"/>
@@ -156,6 +157,7 @@
 <file path=ppt/revisionInfo.xml><?xml version="1.0" encoding="utf-8"?>
 <p1510:revInfo xmlns:a="http://schemas.openxmlformats.org/drawingml/2006/main" xmlns:r="http://schemas.openxmlformats.org/officeDocument/2006/relationships" xmlns:p1510="http://schemas.microsoft.com/office/powerpoint/2015/10/main">
   <p1510:revLst>
+    <p1510:client id="{0451E574-54C2-7145-EBB3-C6A70D499441}" v="9" dt="2021-01-30T13:26:53.655"/>
     <p1510:client id="{249345AC-F203-A65C-FB02-C4C2496257FE}" v="5915" dt="2021-01-27T22:01:38.645"/>
     <p1510:client id="{685CCD3C-5741-2672-18BE-51187E2EB50A}" v="3299" dt="2021-01-29T22:53:39.906"/>
     <p1510:client id="{F199FC93-7B96-4801-B947-7DF3713820CD}" v="3325" dt="2021-01-26T20:58:20.193"/>
@@ -292,7 +294,7 @@
           <a:p>
             <a:fld id="{AD67445C-DD5B-459E-BCAC-A8671F012926}" type="datetimeFigureOut">
               <a:rPr lang="sr-Latn-RS" smtClean="0"/>
-              <a:t>29.1.2021.</a:t>
+              <a:t>30.1.2021.</a:t>
             </a:fld>
             <a:endParaRPr lang="sr-Latn-RS"/>
           </a:p>
@@ -350,13 +352,13 @@
   <p:clrMapOvr>
     <a:masterClrMapping/>
   </p:clrMapOvr>
-  <mc:AlternateContent xmlns:mc="http://schemas.openxmlformats.org/markup-compatibility/2006">
-    <mc:Choice xmlns:p14="http://schemas.microsoft.com/office/powerpoint/2010/main" Requires="p14">
+  <mc:AlternateContent xmlns:mc="http://schemas.openxmlformats.org/markup-compatibility/2006" xmlns:p14="http://schemas.microsoft.com/office/powerpoint/2010/main">
+    <mc:Choice Requires="p14">
       <p:transition spd="slow" p14:dur="3900">
         <p14:glitter pattern="hexagon"/>
       </p:transition>
     </mc:Choice>
-    <mc:Fallback>
+    <mc:Fallback xmlns="">
       <p:transition spd="slow">
         <p:fade/>
       </p:transition>
@@ -472,7 +474,7 @@
           <a:p>
             <a:fld id="{AD67445C-DD5B-459E-BCAC-A8671F012926}" type="datetimeFigureOut">
               <a:rPr lang="sr-Latn-RS" smtClean="0"/>
-              <a:t>29.1.2021.</a:t>
+              <a:t>30.1.2021.</a:t>
             </a:fld>
             <a:endParaRPr lang="sr-Latn-RS"/>
           </a:p>
@@ -530,13 +532,13 @@
   <p:clrMapOvr>
     <a:masterClrMapping/>
   </p:clrMapOvr>
-  <mc:AlternateContent xmlns:mc="http://schemas.openxmlformats.org/markup-compatibility/2006">
-    <mc:Choice xmlns:p14="http://schemas.microsoft.com/office/powerpoint/2010/main" Requires="p14">
+  <mc:AlternateContent xmlns:mc="http://schemas.openxmlformats.org/markup-compatibility/2006" xmlns:p14="http://schemas.microsoft.com/office/powerpoint/2010/main">
+    <mc:Choice Requires="p14">
       <p:transition spd="slow" p14:dur="3900">
         <p14:glitter pattern="hexagon"/>
       </p:transition>
     </mc:Choice>
-    <mc:Fallback>
+    <mc:Fallback xmlns="">
       <p:transition spd="slow">
         <p:fade/>
       </p:transition>
@@ -662,7 +664,7 @@
           <a:p>
             <a:fld id="{AD67445C-DD5B-459E-BCAC-A8671F012926}" type="datetimeFigureOut">
               <a:rPr lang="sr-Latn-RS" smtClean="0"/>
-              <a:t>29.1.2021.</a:t>
+              <a:t>30.1.2021.</a:t>
             </a:fld>
             <a:endParaRPr lang="sr-Latn-RS"/>
           </a:p>
@@ -720,13 +722,13 @@
   <p:clrMapOvr>
     <a:masterClrMapping/>
   </p:clrMapOvr>
-  <mc:AlternateContent xmlns:mc="http://schemas.openxmlformats.org/markup-compatibility/2006">
-    <mc:Choice xmlns:p14="http://schemas.microsoft.com/office/powerpoint/2010/main" Requires="p14">
+  <mc:AlternateContent xmlns:mc="http://schemas.openxmlformats.org/markup-compatibility/2006" xmlns:p14="http://schemas.microsoft.com/office/powerpoint/2010/main">
+    <mc:Choice Requires="p14">
       <p:transition spd="slow" p14:dur="3900">
         <p14:glitter pattern="hexagon"/>
       </p:transition>
     </mc:Choice>
-    <mc:Fallback>
+    <mc:Fallback xmlns="">
       <p:transition spd="slow">
         <p:fade/>
       </p:transition>
@@ -842,7 +844,7 @@
           <a:p>
             <a:fld id="{AD67445C-DD5B-459E-BCAC-A8671F012926}" type="datetimeFigureOut">
               <a:rPr lang="sr-Latn-RS" smtClean="0"/>
-              <a:t>29.1.2021.</a:t>
+              <a:t>30.1.2021.</a:t>
             </a:fld>
             <a:endParaRPr lang="sr-Latn-RS"/>
           </a:p>
@@ -900,13 +902,13 @@
   <p:clrMapOvr>
     <a:masterClrMapping/>
   </p:clrMapOvr>
-  <mc:AlternateContent xmlns:mc="http://schemas.openxmlformats.org/markup-compatibility/2006">
-    <mc:Choice xmlns:p14="http://schemas.microsoft.com/office/powerpoint/2010/main" Requires="p14">
+  <mc:AlternateContent xmlns:mc="http://schemas.openxmlformats.org/markup-compatibility/2006" xmlns:p14="http://schemas.microsoft.com/office/powerpoint/2010/main">
+    <mc:Choice Requires="p14">
       <p:transition spd="slow" p14:dur="3900">
         <p14:glitter pattern="hexagon"/>
       </p:transition>
     </mc:Choice>
-    <mc:Fallback>
+    <mc:Fallback xmlns="">
       <p:transition spd="slow">
         <p:fade/>
       </p:transition>
@@ -1099,7 +1101,7 @@
           <a:p>
             <a:fld id="{AD67445C-DD5B-459E-BCAC-A8671F012926}" type="datetimeFigureOut">
               <a:rPr lang="sr-Latn-RS" smtClean="0"/>
-              <a:t>29.1.2021.</a:t>
+              <a:t>30.1.2021.</a:t>
             </a:fld>
             <a:endParaRPr lang="sr-Latn-RS"/>
           </a:p>
@@ -1157,13 +1159,13 @@
   <p:clrMapOvr>
     <a:masterClrMapping/>
   </p:clrMapOvr>
-  <mc:AlternateContent xmlns:mc="http://schemas.openxmlformats.org/markup-compatibility/2006">
-    <mc:Choice xmlns:p14="http://schemas.microsoft.com/office/powerpoint/2010/main" Requires="p14">
+  <mc:AlternateContent xmlns:mc="http://schemas.openxmlformats.org/markup-compatibility/2006" xmlns:p14="http://schemas.microsoft.com/office/powerpoint/2010/main">
+    <mc:Choice Requires="p14">
       <p:transition spd="slow" p14:dur="3900">
         <p14:glitter pattern="hexagon"/>
       </p:transition>
     </mc:Choice>
-    <mc:Fallback>
+    <mc:Fallback xmlns="">
       <p:transition spd="slow">
         <p:fade/>
       </p:transition>
@@ -1340,7 +1342,7 @@
           <a:p>
             <a:fld id="{AD67445C-DD5B-459E-BCAC-A8671F012926}" type="datetimeFigureOut">
               <a:rPr lang="sr-Latn-RS" smtClean="0"/>
-              <a:t>29.1.2021.</a:t>
+              <a:t>30.1.2021.</a:t>
             </a:fld>
             <a:endParaRPr lang="sr-Latn-RS"/>
           </a:p>
@@ -1398,13 +1400,13 @@
   <p:clrMapOvr>
     <a:masterClrMapping/>
   </p:clrMapOvr>
-  <mc:AlternateContent xmlns:mc="http://schemas.openxmlformats.org/markup-compatibility/2006">
-    <mc:Choice xmlns:p14="http://schemas.microsoft.com/office/powerpoint/2010/main" Requires="p14">
+  <mc:AlternateContent xmlns:mc="http://schemas.openxmlformats.org/markup-compatibility/2006" xmlns:p14="http://schemas.microsoft.com/office/powerpoint/2010/main">
+    <mc:Choice Requires="p14">
       <p:transition spd="slow" p14:dur="3900">
         <p14:glitter pattern="hexagon"/>
       </p:transition>
     </mc:Choice>
-    <mc:Fallback>
+    <mc:Fallback xmlns="">
       <p:transition spd="slow">
         <p:fade/>
       </p:transition>
@@ -1716,7 +1718,7 @@
           <a:p>
             <a:fld id="{AD67445C-DD5B-459E-BCAC-A8671F012926}" type="datetimeFigureOut">
               <a:rPr lang="sr-Latn-RS" smtClean="0"/>
-              <a:t>29.1.2021.</a:t>
+              <a:t>30.1.2021.</a:t>
             </a:fld>
             <a:endParaRPr lang="sr-Latn-RS"/>
           </a:p>
@@ -1774,13 +1776,13 @@
   <p:clrMapOvr>
     <a:masterClrMapping/>
   </p:clrMapOvr>
-  <mc:AlternateContent xmlns:mc="http://schemas.openxmlformats.org/markup-compatibility/2006">
-    <mc:Choice xmlns:p14="http://schemas.microsoft.com/office/powerpoint/2010/main" Requires="p14">
+  <mc:AlternateContent xmlns:mc="http://schemas.openxmlformats.org/markup-compatibility/2006" xmlns:p14="http://schemas.microsoft.com/office/powerpoint/2010/main">
+    <mc:Choice Requires="p14">
       <p:transition spd="slow" p14:dur="3900">
         <p14:glitter pattern="hexagon"/>
       </p:transition>
     </mc:Choice>
-    <mc:Fallback>
+    <mc:Fallback xmlns="">
       <p:transition spd="slow">
         <p:fade/>
       </p:transition>
@@ -1845,7 +1847,7 @@
           <a:p>
             <a:fld id="{AD67445C-DD5B-459E-BCAC-A8671F012926}" type="datetimeFigureOut">
               <a:rPr lang="sr-Latn-RS" smtClean="0"/>
-              <a:t>29.1.2021.</a:t>
+              <a:t>30.1.2021.</a:t>
             </a:fld>
             <a:endParaRPr lang="sr-Latn-RS"/>
           </a:p>
@@ -1903,13 +1905,13 @@
   <p:clrMapOvr>
     <a:masterClrMapping/>
   </p:clrMapOvr>
-  <mc:AlternateContent xmlns:mc="http://schemas.openxmlformats.org/markup-compatibility/2006">
-    <mc:Choice xmlns:p14="http://schemas.microsoft.com/office/powerpoint/2010/main" Requires="p14">
+  <mc:AlternateContent xmlns:mc="http://schemas.openxmlformats.org/markup-compatibility/2006" xmlns:p14="http://schemas.microsoft.com/office/powerpoint/2010/main">
+    <mc:Choice Requires="p14">
       <p:transition spd="slow" p14:dur="3900">
         <p14:glitter pattern="hexagon"/>
       </p:transition>
     </mc:Choice>
-    <mc:Fallback>
+    <mc:Fallback xmlns="">
       <p:transition spd="slow">
         <p:fade/>
       </p:transition>
@@ -1952,7 +1954,7 @@
           <a:p>
             <a:fld id="{AD67445C-DD5B-459E-BCAC-A8671F012926}" type="datetimeFigureOut">
               <a:rPr lang="sr-Latn-RS" smtClean="0"/>
-              <a:t>29.1.2021.</a:t>
+              <a:t>30.1.2021.</a:t>
             </a:fld>
             <a:endParaRPr lang="sr-Latn-RS"/>
           </a:p>
@@ -2010,13 +2012,13 @@
   <p:clrMapOvr>
     <a:masterClrMapping/>
   </p:clrMapOvr>
-  <mc:AlternateContent xmlns:mc="http://schemas.openxmlformats.org/markup-compatibility/2006">
-    <mc:Choice xmlns:p14="http://schemas.microsoft.com/office/powerpoint/2010/main" Requires="p14">
+  <mc:AlternateContent xmlns:mc="http://schemas.openxmlformats.org/markup-compatibility/2006" xmlns:p14="http://schemas.microsoft.com/office/powerpoint/2010/main">
+    <mc:Choice Requires="p14">
       <p:transition spd="slow" p14:dur="3900">
         <p14:glitter pattern="hexagon"/>
       </p:transition>
     </mc:Choice>
-    <mc:Fallback>
+    <mc:Fallback xmlns="">
       <p:transition spd="slow">
         <p:fade/>
       </p:transition>
@@ -2239,7 +2241,7 @@
           <a:p>
             <a:fld id="{AD67445C-DD5B-459E-BCAC-A8671F012926}" type="datetimeFigureOut">
               <a:rPr lang="sr-Latn-RS" smtClean="0"/>
-              <a:t>29.1.2021.</a:t>
+              <a:t>30.1.2021.</a:t>
             </a:fld>
             <a:endParaRPr lang="sr-Latn-RS"/>
           </a:p>
@@ -2297,13 +2299,13 @@
   <p:clrMapOvr>
     <a:masterClrMapping/>
   </p:clrMapOvr>
-  <mc:AlternateContent xmlns:mc="http://schemas.openxmlformats.org/markup-compatibility/2006">
-    <mc:Choice xmlns:p14="http://schemas.microsoft.com/office/powerpoint/2010/main" Requires="p14">
+  <mc:AlternateContent xmlns:mc="http://schemas.openxmlformats.org/markup-compatibility/2006" xmlns:p14="http://schemas.microsoft.com/office/powerpoint/2010/main">
+    <mc:Choice Requires="p14">
       <p:transition spd="slow" p14:dur="3900">
         <p14:glitter pattern="hexagon"/>
       </p:transition>
     </mc:Choice>
-    <mc:Fallback>
+    <mc:Fallback xmlns="">
       <p:transition spd="slow">
         <p:fade/>
       </p:transition>
@@ -2503,7 +2505,7 @@
           <a:p>
             <a:fld id="{AD67445C-DD5B-459E-BCAC-A8671F012926}" type="datetimeFigureOut">
               <a:rPr lang="sr-Latn-RS" smtClean="0"/>
-              <a:t>29.1.2021.</a:t>
+              <a:t>30.1.2021.</a:t>
             </a:fld>
             <a:endParaRPr lang="sr-Latn-RS"/>
           </a:p>
@@ -2561,13 +2563,13 @@
   <p:clrMapOvr>
     <a:masterClrMapping/>
   </p:clrMapOvr>
-  <mc:AlternateContent xmlns:mc="http://schemas.openxmlformats.org/markup-compatibility/2006">
-    <mc:Choice xmlns:p14="http://schemas.microsoft.com/office/powerpoint/2010/main" Requires="p14">
+  <mc:AlternateContent xmlns:mc="http://schemas.openxmlformats.org/markup-compatibility/2006" xmlns:p14="http://schemas.microsoft.com/office/powerpoint/2010/main">
+    <mc:Choice Requires="p14">
       <p:transition spd="slow" p14:dur="3900">
         <p14:glitter pattern="hexagon"/>
       </p:transition>
     </mc:Choice>
-    <mc:Fallback>
+    <mc:Fallback xmlns="">
       <p:transition spd="slow">
         <p:fade/>
       </p:transition>
@@ -2726,7 +2728,7 @@
           <a:p>
             <a:fld id="{AD67445C-DD5B-459E-BCAC-A8671F012926}" type="datetimeFigureOut">
               <a:rPr lang="sr-Latn-RS" smtClean="0"/>
-              <a:t>29.1.2021.</a:t>
+              <a:t>30.1.2021.</a:t>
             </a:fld>
             <a:endParaRPr lang="sr-Latn-RS"/>
           </a:p>
@@ -2831,13 +2833,13 @@
     <p:sldLayoutId id="2147483658" r:id="rId10"/>
     <p:sldLayoutId id="2147483659" r:id="rId11"/>
   </p:sldLayoutIdLst>
-  <mc:AlternateContent xmlns:mc="http://schemas.openxmlformats.org/markup-compatibility/2006">
-    <mc:Choice xmlns:p14="http://schemas.microsoft.com/office/powerpoint/2010/main" Requires="p14">
+  <mc:AlternateContent xmlns:mc="http://schemas.openxmlformats.org/markup-compatibility/2006" xmlns:p14="http://schemas.microsoft.com/office/powerpoint/2010/main">
+    <mc:Choice Requires="p14">
       <p:transition spd="slow" p14:dur="3900">
         <p14:glitter pattern="hexagon"/>
       </p:transition>
     </mc:Choice>
-    <mc:Fallback>
+    <mc:Fallback xmlns="">
       <p:transition spd="slow">
         <p:fade/>
       </p:transition>
@@ -3711,13 +3713,13 @@
   <p:clrMapOvr>
     <a:masterClrMapping/>
   </p:clrMapOvr>
-  <mc:AlternateContent xmlns:mc="http://schemas.openxmlformats.org/markup-compatibility/2006">
-    <mc:Choice xmlns:p14="http://schemas.microsoft.com/office/powerpoint/2010/main" Requires="p14">
+  <mc:AlternateContent xmlns:mc="http://schemas.openxmlformats.org/markup-compatibility/2006" xmlns:p14="http://schemas.microsoft.com/office/powerpoint/2010/main">
+    <mc:Choice Requires="p14">
       <p:transition spd="slow" p14:dur="3900">
         <p14:glitter pattern="hexagon"/>
       </p:transition>
     </mc:Choice>
-    <mc:Fallback>
+    <mc:Fallback xmlns="">
       <p:transition spd="slow">
         <p:fade/>
       </p:transition>
@@ -4352,13 +4354,13 @@
   <p:clrMapOvr>
     <a:masterClrMapping/>
   </p:clrMapOvr>
-  <mc:AlternateContent xmlns:mc="http://schemas.openxmlformats.org/markup-compatibility/2006">
-    <mc:Choice xmlns:p14="http://schemas.microsoft.com/office/powerpoint/2010/main" Requires="p14">
+  <mc:AlternateContent xmlns:mc="http://schemas.openxmlformats.org/markup-compatibility/2006" xmlns:p14="http://schemas.microsoft.com/office/powerpoint/2010/main">
+    <mc:Choice Requires="p14">
       <p:transition spd="slow" p14:dur="3900">
         <p14:glitter pattern="hexagon"/>
       </p:transition>
     </mc:Choice>
-    <mc:Fallback>
+    <mc:Fallback xmlns="">
       <p:transition spd="slow">
         <p:fade/>
       </p:transition>
@@ -5029,13 +5031,13 @@
   <p:clrMapOvr>
     <a:masterClrMapping/>
   </p:clrMapOvr>
-  <mc:AlternateContent xmlns:mc="http://schemas.openxmlformats.org/markup-compatibility/2006">
-    <mc:Choice xmlns:p14="http://schemas.microsoft.com/office/powerpoint/2010/main" Requires="p14">
+  <mc:AlternateContent xmlns:mc="http://schemas.openxmlformats.org/markup-compatibility/2006" xmlns:p14="http://schemas.microsoft.com/office/powerpoint/2010/main">
+    <mc:Choice Requires="p14">
       <p:transition spd="slow" p14:dur="3900">
         <p14:glitter pattern="hexagon"/>
       </p:transition>
     </mc:Choice>
-    <mc:Fallback>
+    <mc:Fallback xmlns="">
       <p:transition spd="slow">
         <p:fade/>
       </p:transition>
@@ -5740,13 +5742,13 @@
   <p:clrMapOvr>
     <a:masterClrMapping/>
   </p:clrMapOvr>
-  <mc:AlternateContent xmlns:mc="http://schemas.openxmlformats.org/markup-compatibility/2006">
-    <mc:Choice xmlns:p14="http://schemas.microsoft.com/office/powerpoint/2010/main" Requires="p14">
+  <mc:AlternateContent xmlns:mc="http://schemas.openxmlformats.org/markup-compatibility/2006" xmlns:p14="http://schemas.microsoft.com/office/powerpoint/2010/main">
+    <mc:Choice Requires="p14">
       <p:transition spd="slow" p14:dur="3900">
         <p14:glitter pattern="hexagon"/>
       </p:transition>
     </mc:Choice>
-    <mc:Fallback>
+    <mc:Fallback xmlns="">
       <p:transition spd="slow">
         <p:fade/>
       </p:transition>
@@ -6415,13 +6417,13 @@
   <p:clrMapOvr>
     <a:masterClrMapping/>
   </p:clrMapOvr>
-  <mc:AlternateContent xmlns:mc="http://schemas.openxmlformats.org/markup-compatibility/2006">
-    <mc:Choice xmlns:p14="http://schemas.microsoft.com/office/powerpoint/2010/main" Requires="p14">
+  <mc:AlternateContent xmlns:mc="http://schemas.openxmlformats.org/markup-compatibility/2006" xmlns:p14="http://schemas.microsoft.com/office/powerpoint/2010/main">
+    <mc:Choice Requires="p14">
       <p:transition spd="slow" p14:dur="3900">
         <p14:glitter pattern="hexagon"/>
       </p:transition>
     </mc:Choice>
-    <mc:Fallback>
+    <mc:Fallback xmlns="">
       <p:transition spd="slow">
         <p:fade/>
       </p:transition>
@@ -7125,13 +7127,13 @@
   <p:clrMapOvr>
     <a:masterClrMapping/>
   </p:clrMapOvr>
-  <mc:AlternateContent xmlns:mc="http://schemas.openxmlformats.org/markup-compatibility/2006">
-    <mc:Choice xmlns:p14="http://schemas.microsoft.com/office/powerpoint/2010/main" Requires="p14">
+  <mc:AlternateContent xmlns:mc="http://schemas.openxmlformats.org/markup-compatibility/2006" xmlns:p14="http://schemas.microsoft.com/office/powerpoint/2010/main">
+    <mc:Choice Requires="p14">
       <p:transition spd="slow" p14:dur="3900">
         <p14:glitter pattern="hexagon"/>
       </p:transition>
     </mc:Choice>
-    <mc:Fallback>
+    <mc:Fallback xmlns="">
       <p:transition spd="slow">
         <p:fade/>
       </p:transition>
@@ -7776,13 +7778,13 @@
   <p:clrMapOvr>
     <a:masterClrMapping/>
   </p:clrMapOvr>
-  <mc:AlternateContent xmlns:mc="http://schemas.openxmlformats.org/markup-compatibility/2006">
-    <mc:Choice xmlns:p14="http://schemas.microsoft.com/office/powerpoint/2010/main" Requires="p14">
+  <mc:AlternateContent xmlns:mc="http://schemas.openxmlformats.org/markup-compatibility/2006" xmlns:p14="http://schemas.microsoft.com/office/powerpoint/2010/main">
+    <mc:Choice Requires="p14">
       <p:transition spd="slow" p14:dur="3900">
         <p14:glitter pattern="hexagon"/>
       </p:transition>
     </mc:Choice>
-    <mc:Fallback>
+    <mc:Fallback xmlns="">
       <p:transition spd="slow">
         <p:fade/>
       </p:transition>
@@ -8359,13 +8361,13 @@
   <p:clrMapOvr>
     <a:masterClrMapping/>
   </p:clrMapOvr>
-  <mc:AlternateContent xmlns:mc="http://schemas.openxmlformats.org/markup-compatibility/2006">
-    <mc:Choice xmlns:p14="http://schemas.microsoft.com/office/powerpoint/2010/main" Requires="p14">
+  <mc:AlternateContent xmlns:mc="http://schemas.openxmlformats.org/markup-compatibility/2006" xmlns:p14="http://schemas.microsoft.com/office/powerpoint/2010/main">
+    <mc:Choice Requires="p14">
       <p:transition spd="slow" p14:dur="3900">
         <p14:glitter pattern="hexagon"/>
       </p:transition>
     </mc:Choice>
-    <mc:Fallback>
+    <mc:Fallback xmlns="">
       <p:transition spd="slow">
         <p:fade/>
       </p:transition>
@@ -8944,13 +8946,13 @@
   <p:clrMapOvr>
     <a:masterClrMapping/>
   </p:clrMapOvr>
-  <mc:AlternateContent xmlns:mc="http://schemas.openxmlformats.org/markup-compatibility/2006">
-    <mc:Choice xmlns:p14="http://schemas.microsoft.com/office/powerpoint/2010/main" Requires="p14">
+  <mc:AlternateContent xmlns:mc="http://schemas.openxmlformats.org/markup-compatibility/2006" xmlns:p14="http://schemas.microsoft.com/office/powerpoint/2010/main">
+    <mc:Choice Requires="p14">
       <p:transition spd="slow" p14:dur="3900">
         <p14:glitter pattern="hexagon"/>
       </p:transition>
     </mc:Choice>
-    <mc:Fallback>
+    <mc:Fallback xmlns="">
       <p:transition spd="slow">
         <p:fade/>
       </p:transition>
@@ -9606,13 +9608,13 @@
   <p:clrMapOvr>
     <a:masterClrMapping/>
   </p:clrMapOvr>
-  <mc:AlternateContent xmlns:mc="http://schemas.openxmlformats.org/markup-compatibility/2006">
-    <mc:Choice xmlns:p14="http://schemas.microsoft.com/office/powerpoint/2010/main" Requires="p14">
+  <mc:AlternateContent xmlns:mc="http://schemas.openxmlformats.org/markup-compatibility/2006" xmlns:p14="http://schemas.microsoft.com/office/powerpoint/2010/main">
+    <mc:Choice Requires="p14">
       <p:transition spd="slow" p14:dur="3900">
         <p14:glitter pattern="hexagon"/>
       </p:transition>
     </mc:Choice>
-    <mc:Fallback>
+    <mc:Fallback xmlns="">
       <p:transition spd="slow">
         <p:fade/>
       </p:transition>
@@ -10190,13 +10192,13 @@
   <p:clrMapOvr>
     <a:masterClrMapping/>
   </p:clrMapOvr>
-  <mc:AlternateContent xmlns:mc="http://schemas.openxmlformats.org/markup-compatibility/2006">
-    <mc:Choice xmlns:p14="http://schemas.microsoft.com/office/powerpoint/2010/main" Requires="p14">
+  <mc:AlternateContent xmlns:mc="http://schemas.openxmlformats.org/markup-compatibility/2006" xmlns:p14="http://schemas.microsoft.com/office/powerpoint/2010/main">
+    <mc:Choice Requires="p14">
       <p:transition spd="slow" p14:dur="3900">
         <p14:glitter pattern="hexagon"/>
       </p:transition>
     </mc:Choice>
-    <mc:Fallback>
+    <mc:Fallback xmlns="">
       <p:transition spd="slow">
         <p:fade/>
       </p:transition>
@@ -10727,13 +10729,13 @@
   <p:clrMapOvr>
     <a:masterClrMapping/>
   </p:clrMapOvr>
-  <mc:AlternateContent xmlns:mc="http://schemas.openxmlformats.org/markup-compatibility/2006">
-    <mc:Choice xmlns:p14="http://schemas.microsoft.com/office/powerpoint/2010/main" Requires="p14">
+  <mc:AlternateContent xmlns:mc="http://schemas.openxmlformats.org/markup-compatibility/2006" xmlns:p14="http://schemas.microsoft.com/office/powerpoint/2010/main">
+    <mc:Choice Requires="p14">
       <p:transition spd="slow" p14:dur="3900">
         <p14:glitter pattern="hexagon"/>
       </p:transition>
     </mc:Choice>
-    <mc:Fallback>
+    <mc:Fallback xmlns="">
       <p:transition spd="slow">
         <p:fade/>
       </p:transition>
@@ -11364,13 +11366,13 @@
   <p:clrMapOvr>
     <a:masterClrMapping/>
   </p:clrMapOvr>
-  <mc:AlternateContent xmlns:mc="http://schemas.openxmlformats.org/markup-compatibility/2006">
-    <mc:Choice xmlns:p14="http://schemas.microsoft.com/office/powerpoint/2010/main" Requires="p14">
+  <mc:AlternateContent xmlns:mc="http://schemas.openxmlformats.org/markup-compatibility/2006" xmlns:p14="http://schemas.microsoft.com/office/powerpoint/2010/main">
+    <mc:Choice Requires="p14">
       <p:transition spd="slow" p14:dur="3900">
         <p14:glitter pattern="hexagon"/>
       </p:transition>
     </mc:Choice>
-    <mc:Fallback>
+    <mc:Fallback xmlns="">
       <p:transition spd="slow">
         <p:fade/>
       </p:transition>
@@ -12246,13 +12248,13 @@
   <p:clrMapOvr>
     <a:masterClrMapping/>
   </p:clrMapOvr>
-  <mc:AlternateContent xmlns:mc="http://schemas.openxmlformats.org/markup-compatibility/2006">
-    <mc:Choice xmlns:p14="http://schemas.microsoft.com/office/powerpoint/2010/main" Requires="p14">
+  <mc:AlternateContent xmlns:mc="http://schemas.openxmlformats.org/markup-compatibility/2006" xmlns:p14="http://schemas.microsoft.com/office/powerpoint/2010/main">
+    <mc:Choice Requires="p14">
       <p:transition spd="slow" p14:dur="3900">
         <p14:glitter pattern="hexagon"/>
       </p:transition>
     </mc:Choice>
-    <mc:Fallback>
+    <mc:Fallback xmlns="">
       <p:transition spd="slow">
         <p:fade/>
       </p:transition>
@@ -12886,13 +12888,13 @@
   <p:clrMapOvr>
     <a:masterClrMapping/>
   </p:clrMapOvr>
-  <mc:AlternateContent xmlns:mc="http://schemas.openxmlformats.org/markup-compatibility/2006">
-    <mc:Choice xmlns:p14="http://schemas.microsoft.com/office/powerpoint/2010/main" Requires="p14">
+  <mc:AlternateContent xmlns:mc="http://schemas.openxmlformats.org/markup-compatibility/2006" xmlns:p14="http://schemas.microsoft.com/office/powerpoint/2010/main">
+    <mc:Choice Requires="p14">
       <p:transition spd="slow" p14:dur="3900">
         <p14:glitter pattern="hexagon"/>
       </p:transition>
     </mc:Choice>
-    <mc:Fallback>
+    <mc:Fallback xmlns="">
       <p:transition spd="slow">
         <p:fade/>
       </p:transition>
@@ -13546,13 +13548,13 @@
   <p:clrMapOvr>
     <a:masterClrMapping/>
   </p:clrMapOvr>
-  <mc:AlternateContent xmlns:mc="http://schemas.openxmlformats.org/markup-compatibility/2006">
-    <mc:Choice xmlns:p14="http://schemas.microsoft.com/office/powerpoint/2010/main" Requires="p14">
+  <mc:AlternateContent xmlns:mc="http://schemas.openxmlformats.org/markup-compatibility/2006" xmlns:p14="http://schemas.microsoft.com/office/powerpoint/2010/main">
+    <mc:Choice Requires="p14">
       <p:transition spd="slow" p14:dur="3900">
         <p14:glitter pattern="hexagon"/>
       </p:transition>
     </mc:Choice>
-    <mc:Fallback>
+    <mc:Fallback xmlns="">
       <p:transition spd="slow">
         <p:fade/>
       </p:transition>
@@ -14169,13 +14171,13 @@
   <p:clrMapOvr>
     <a:masterClrMapping/>
   </p:clrMapOvr>
-  <mc:AlternateContent xmlns:mc="http://schemas.openxmlformats.org/markup-compatibility/2006">
-    <mc:Choice xmlns:p14="http://schemas.microsoft.com/office/powerpoint/2010/main" Requires="p14">
+  <mc:AlternateContent xmlns:mc="http://schemas.openxmlformats.org/markup-compatibility/2006" xmlns:p14="http://schemas.microsoft.com/office/powerpoint/2010/main">
+    <mc:Choice Requires="p14">
       <p:transition spd="slow" p14:dur="3900">
         <p14:glitter pattern="hexagon"/>
       </p:transition>
     </mc:Choice>
-    <mc:Fallback>
+    <mc:Fallback xmlns="">
       <p:transition spd="slow">
         <p:fade/>
       </p:transition>
@@ -14824,13 +14826,13 @@
   <p:clrMapOvr>
     <a:masterClrMapping/>
   </p:clrMapOvr>
-  <mc:AlternateContent xmlns:mc="http://schemas.openxmlformats.org/markup-compatibility/2006">
-    <mc:Choice xmlns:p14="http://schemas.microsoft.com/office/powerpoint/2010/main" Requires="p14">
+  <mc:AlternateContent xmlns:mc="http://schemas.openxmlformats.org/markup-compatibility/2006" xmlns:p14="http://schemas.microsoft.com/office/powerpoint/2010/main">
+    <mc:Choice Requires="p14">
       <p:transition spd="slow" p14:dur="3900">
         <p14:glitter pattern="hexagon"/>
       </p:transition>
     </mc:Choice>
-    <mc:Fallback>
+    <mc:Fallback xmlns="">
       <p:transition spd="slow">
         <p:fade/>
       </p:transition>
@@ -15414,13 +15416,13 @@
   <p:clrMapOvr>
     <a:masterClrMapping/>
   </p:clrMapOvr>
-  <mc:AlternateContent xmlns:mc="http://schemas.openxmlformats.org/markup-compatibility/2006">
-    <mc:Choice xmlns:p14="http://schemas.microsoft.com/office/powerpoint/2010/main" Requires="p14">
+  <mc:AlternateContent xmlns:mc="http://schemas.openxmlformats.org/markup-compatibility/2006" xmlns:p14="http://schemas.microsoft.com/office/powerpoint/2010/main">
+    <mc:Choice Requires="p14">
       <p:transition spd="slow" p14:dur="3900">
         <p14:glitter pattern="hexagon"/>
       </p:transition>
     </mc:Choice>
-    <mc:Fallback>
+    <mc:Fallback xmlns="">
       <p:transition spd="slow">
         <p:fade/>
       </p:transition>
@@ -16004,13 +16006,13 @@
   <p:clrMapOvr>
     <a:masterClrMapping/>
   </p:clrMapOvr>
-  <mc:AlternateContent xmlns:mc="http://schemas.openxmlformats.org/markup-compatibility/2006">
-    <mc:Choice xmlns:p14="http://schemas.microsoft.com/office/powerpoint/2010/main" Requires="p14">
+  <mc:AlternateContent xmlns:mc="http://schemas.openxmlformats.org/markup-compatibility/2006" xmlns:p14="http://schemas.microsoft.com/office/powerpoint/2010/main">
+    <mc:Choice Requires="p14">
       <p:transition spd="slow" p14:dur="3900">
         <p14:glitter pattern="hexagon"/>
       </p:transition>
     </mc:Choice>
-    <mc:Fallback>
+    <mc:Fallback xmlns="">
       <p:transition spd="slow">
         <p:fade/>
       </p:transition>
@@ -16667,13 +16669,13 @@
   <p:clrMapOvr>
     <a:masterClrMapping/>
   </p:clrMapOvr>
-  <mc:AlternateContent xmlns:mc="http://schemas.openxmlformats.org/markup-compatibility/2006">
-    <mc:Choice xmlns:p14="http://schemas.microsoft.com/office/powerpoint/2010/main" Requires="p14">
+  <mc:AlternateContent xmlns:mc="http://schemas.openxmlformats.org/markup-compatibility/2006" xmlns:p14="http://schemas.microsoft.com/office/powerpoint/2010/main">
+    <mc:Choice Requires="p14">
       <p:transition spd="slow" p14:dur="3900">
         <p14:glitter pattern="hexagon"/>
       </p:transition>
     </mc:Choice>
-    <mc:Fallback>
+    <mc:Fallback xmlns="">
       <p:transition spd="slow">
         <p:fade/>
       </p:transition>
@@ -17328,13 +17330,13 @@
   <p:clrMapOvr>
     <a:masterClrMapping/>
   </p:clrMapOvr>
-  <mc:AlternateContent xmlns:mc="http://schemas.openxmlformats.org/markup-compatibility/2006">
-    <mc:Choice xmlns:p14="http://schemas.microsoft.com/office/powerpoint/2010/main" Requires="p14">
+  <mc:AlternateContent xmlns:mc="http://schemas.openxmlformats.org/markup-compatibility/2006" xmlns:p14="http://schemas.microsoft.com/office/powerpoint/2010/main">
+    <mc:Choice Requires="p14">
       <p:transition spd="slow" p14:dur="3900">
         <p14:glitter pattern="hexagon"/>
       </p:transition>
     </mc:Choice>
-    <mc:Fallback>
+    <mc:Fallback xmlns="">
       <p:transition spd="slow">
         <p:fade/>
       </p:transition>
@@ -17974,13 +17976,13 @@
   <p:clrMapOvr>
     <a:masterClrMapping/>
   </p:clrMapOvr>
-  <mc:AlternateContent xmlns:mc="http://schemas.openxmlformats.org/markup-compatibility/2006">
-    <mc:Choice xmlns:p14="http://schemas.microsoft.com/office/powerpoint/2010/main" Requires="p14">
+  <mc:AlternateContent xmlns:mc="http://schemas.openxmlformats.org/markup-compatibility/2006" xmlns:p14="http://schemas.microsoft.com/office/powerpoint/2010/main">
+    <mc:Choice Requires="p14">
       <p:transition spd="slow" p14:dur="3900">
         <p14:glitter pattern="hexagon"/>
       </p:transition>
     </mc:Choice>
-    <mc:Fallback>
+    <mc:Fallback xmlns="">
       <p:transition spd="slow">
         <p:fade/>
       </p:transition>
@@ -18904,13 +18906,13 @@
   <p:clrMapOvr>
     <a:masterClrMapping/>
   </p:clrMapOvr>
-  <mc:AlternateContent xmlns:mc="http://schemas.openxmlformats.org/markup-compatibility/2006">
-    <mc:Choice xmlns:p14="http://schemas.microsoft.com/office/powerpoint/2010/main" Requires="p14">
+  <mc:AlternateContent xmlns:mc="http://schemas.openxmlformats.org/markup-compatibility/2006" xmlns:p14="http://schemas.microsoft.com/office/powerpoint/2010/main">
+    <mc:Choice Requires="p14">
       <p:transition spd="slow" p14:dur="3900">
         <p14:glitter pattern="hexagon"/>
       </p:transition>
     </mc:Choice>
-    <mc:Fallback>
+    <mc:Fallback xmlns="">
       <p:transition spd="slow">
         <p:fade/>
       </p:transition>
@@ -19637,13 +19639,13 @@
   <p:clrMapOvr>
     <a:masterClrMapping/>
   </p:clrMapOvr>
-  <mc:AlternateContent xmlns:mc="http://schemas.openxmlformats.org/markup-compatibility/2006">
-    <mc:Choice xmlns:p14="http://schemas.microsoft.com/office/powerpoint/2010/main" Requires="p14">
+  <mc:AlternateContent xmlns:mc="http://schemas.openxmlformats.org/markup-compatibility/2006" xmlns:p14="http://schemas.microsoft.com/office/powerpoint/2010/main">
+    <mc:Choice Requires="p14">
       <p:transition spd="slow" p14:dur="3900">
         <p14:glitter pattern="hexagon"/>
       </p:transition>
     </mc:Choice>
-    <mc:Fallback>
+    <mc:Fallback xmlns="">
       <p:transition spd="slow">
         <p:fade/>
       </p:transition>
@@ -20234,13 +20236,13 @@
   <p:clrMapOvr>
     <a:masterClrMapping/>
   </p:clrMapOvr>
-  <mc:AlternateContent xmlns:mc="http://schemas.openxmlformats.org/markup-compatibility/2006">
-    <mc:Choice xmlns:p14="http://schemas.microsoft.com/office/powerpoint/2010/main" Requires="p14">
+  <mc:AlternateContent xmlns:mc="http://schemas.openxmlformats.org/markup-compatibility/2006" xmlns:p14="http://schemas.microsoft.com/office/powerpoint/2010/main">
+    <mc:Choice Requires="p14">
       <p:transition spd="slow" p14:dur="3900">
         <p14:glitter pattern="hexagon"/>
       </p:transition>
     </mc:Choice>
-    <mc:Fallback>
+    <mc:Fallback xmlns="">
       <p:transition spd="slow">
         <p:fade/>
       </p:transition>
@@ -20891,13 +20893,13 @@
   <p:clrMapOvr>
     <a:masterClrMapping/>
   </p:clrMapOvr>
-  <mc:AlternateContent xmlns:mc="http://schemas.openxmlformats.org/markup-compatibility/2006">
-    <mc:Choice xmlns:p14="http://schemas.microsoft.com/office/powerpoint/2010/main" Requires="p14">
+  <mc:AlternateContent xmlns:mc="http://schemas.openxmlformats.org/markup-compatibility/2006" xmlns:p14="http://schemas.microsoft.com/office/powerpoint/2010/main">
+    <mc:Choice Requires="p14">
       <p:transition spd="slow" p14:dur="3900">
         <p14:glitter pattern="hexagon"/>
       </p:transition>
     </mc:Choice>
-    <mc:Fallback>
+    <mc:Fallback xmlns="">
       <p:transition spd="slow">
         <p:fade/>
       </p:transition>
@@ -21496,13 +21498,13 @@
   <p:clrMapOvr>
     <a:masterClrMapping/>
   </p:clrMapOvr>
-  <mc:AlternateContent xmlns:mc="http://schemas.openxmlformats.org/markup-compatibility/2006">
-    <mc:Choice xmlns:p14="http://schemas.microsoft.com/office/powerpoint/2010/main" Requires="p14">
+  <mc:AlternateContent xmlns:mc="http://schemas.openxmlformats.org/markup-compatibility/2006" xmlns:p14="http://schemas.microsoft.com/office/powerpoint/2010/main">
+    <mc:Choice Requires="p14">
       <p:transition spd="slow" p14:dur="3900">
         <p14:glitter pattern="hexagon"/>
       </p:transition>
     </mc:Choice>
-    <mc:Fallback>
+    <mc:Fallback xmlns="">
       <p:transition spd="slow">
         <p:fade/>
       </p:transition>
@@ -21985,93 +21987,7 @@
             <a:pPr marL="0" indent="0" algn="ctr">
               <a:buNone/>
             </a:pPr>
-            <a:r>
-              <a:rPr lang="sr-Latn-RS" b="1" i="1">
-                <a:cs typeface="Calibri" panose="020F0502020204030204"/>
-              </a:rPr>
-              <a:t>unique_ptr</a:t>
-            </a:r>
             <a:endParaRPr lang="sr-Latn-RS" b="1" dirty="0">
-              <a:cs typeface="Calibri" panose="020F0502020204030204"/>
-            </a:endParaRPr>
-          </a:p>
-          <a:p>
-            <a:pPr marL="0" indent="0" algn="ctr">
-              <a:buNone/>
-            </a:pPr>
-            <a:endParaRPr lang="sr-Latn-RS" sz="2000" b="1" i="1" dirty="0">
-              <a:cs typeface="Calibri" panose="020F0502020204030204"/>
-            </a:endParaRPr>
-          </a:p>
-          <a:p>
-            <a:pPr marL="0" indent="0" algn="just">
-              <a:buNone/>
-            </a:pPr>
-            <a:r>
-              <a:rPr lang="sr-Latn-RS" sz="2000" b="1" i="1" dirty="0">
-                <a:cs typeface="Calibri" panose="020F0502020204030204"/>
-              </a:rPr>
-              <a:t>unique_ptr </a:t>
-            </a:r>
-            <a:r>
-              <a:rPr lang="sr-Latn-RS" sz="2000" dirty="0">
-                <a:cs typeface="Calibri" panose="020F0502020204030204"/>
-              </a:rPr>
-              <a:t>se pojavio u standardu C++11, kao zamena za </a:t>
-            </a:r>
-            <a:r>
-              <a:rPr lang="sr-Latn-RS" sz="2000" b="1" i="1" dirty="0">
-                <a:cs typeface="Calibri" panose="020F0502020204030204"/>
-              </a:rPr>
-              <a:t>auto_ptr</a:t>
-            </a:r>
-            <a:r>
-              <a:rPr lang="sr-Latn-RS" sz="2000" dirty="0">
-                <a:cs typeface="Calibri" panose="020F0502020204030204"/>
-              </a:rPr>
-              <a:t>, ima slične funkcionalnosti sa poboljšanom sigurnošću, dodatnim funkcijama i podrškom za rad da nizovima. Ovi pokazivači dozvoljavaju samo jednog vlasnika nad resursom. Kada se koristi </a:t>
-            </a:r>
-            <a:r>
-              <a:rPr lang="sr-Latn-RS" sz="2000" b="1" i="1" dirty="0">
-                <a:cs typeface="Calibri" panose="020F0502020204030204"/>
-              </a:rPr>
-              <a:t>unique_ptr</a:t>
-            </a:r>
-            <a:r>
-              <a:rPr lang="sr-Latn-RS" sz="2000" dirty="0">
-                <a:cs typeface="Calibri" panose="020F0502020204030204"/>
-              </a:rPr>
-              <a:t>, može postojati samo jedan takav pokazivač nad tim resursom i kada se taj pokazivač uništi, resurs se oslobađa. </a:t>
-            </a:r>
-            <a:r>
-              <a:rPr lang="sr-Latn-RS" sz="2000">
-                <a:cs typeface="Calibri" panose="020F0502020204030204"/>
-              </a:rPr>
-              <a:t>Pošto podržavaju politiku jednog vlasnika, pokušaj kopiranja prouzvokovaće grešku prilikom kompajliranja.</a:t>
-            </a:r>
-          </a:p>
-          <a:p>
-            <a:pPr marL="0" indent="0" algn="just">
-              <a:buNone/>
-            </a:pPr>
-            <a:endParaRPr lang="sr-Latn-RS" sz="2000" dirty="0">
-              <a:ea typeface="+mn-lt"/>
-              <a:cs typeface="+mn-lt"/>
-            </a:endParaRPr>
-          </a:p>
-          <a:p>
-            <a:pPr marL="0" indent="0" algn="just">
-              <a:buNone/>
-            </a:pPr>
-            <a:endParaRPr lang="sr-Latn-RS" dirty="0">
-              <a:cs typeface="Calibri" panose="020F0502020204030204"/>
-            </a:endParaRPr>
-          </a:p>
-          <a:p>
-            <a:pPr marL="0" indent="0" algn="just">
-              <a:buNone/>
-            </a:pPr>
-            <a:endParaRPr lang="sr-Latn-RS" b="1" i="1" dirty="0">
               <a:cs typeface="Calibri" panose="020F0502020204030204"/>
             </a:endParaRPr>
           </a:p>
@@ -22119,10 +22035,10 @@
       </p:sp>
       <p:pic>
         <p:nvPicPr>
-          <p:cNvPr id="4" name="Slika 4" descr="Slika na kojoj se nalazi tekst&#10;&#10;Opis je automatski generisan">
-            <a:extLst>
-              <a:ext uri="{FF2B5EF4-FFF2-40B4-BE49-F238E27FC236}">
-                <a16:creationId xmlns:a16="http://schemas.microsoft.com/office/drawing/2014/main" id="{2E5296C4-C028-45A6-9841-EF6CEABDDCB5}"/>
+          <p:cNvPr id="6" name="Slika 6" descr="Slika na kojoj se nalazi tekst&#10;&#10;Opis je automatski generisan">
+            <a:extLst>
+              <a:ext uri="{FF2B5EF4-FFF2-40B4-BE49-F238E27FC236}">
+                <a16:creationId xmlns:a16="http://schemas.microsoft.com/office/drawing/2014/main" id="{C1017EBF-4C75-451F-A21A-4E461CB7E1F5}"/>
               </a:ext>
             </a:extLst>
           </p:cNvPr>
@@ -22139,8 +22055,8 @@
         </p:blipFill>
         <p:spPr>
           <a:xfrm>
-            <a:off x="3242153" y="4672457"/>
-            <a:ext cx="6166980" cy="1343963"/>
+            <a:off x="2761989" y="1904136"/>
+            <a:ext cx="6678459" cy="4333644"/>
           </a:xfrm>
           <a:prstGeom prst="rect">
             <a:avLst/>
@@ -22150,7 +22066,7 @@
     </p:spTree>
     <p:extLst>
       <p:ext uri="{BB962C8B-B14F-4D97-AF65-F5344CB8AC3E}">
-        <p14:creationId xmlns:p14="http://schemas.microsoft.com/office/powerpoint/2010/main" val="13777408"/>
+        <p14:creationId xmlns:p14="http://schemas.microsoft.com/office/powerpoint/2010/main" val="147375614"/>
       </p:ext>
     </p:extLst>
   </p:cSld>
@@ -22639,142 +22555,108 @@
         </p:spPr>
         <p:txBody>
           <a:bodyPr vert="horz" lIns="91440" tIns="45720" rIns="91440" bIns="45720" rtlCol="0" anchor="t">
-            <a:normAutofit lnSpcReduction="10000"/>
+            <a:normAutofit/>
           </a:bodyPr>
           <a:lstStyle/>
           <a:p>
+            <a:pPr marL="0" indent="0" algn="ctr">
+              <a:buNone/>
+            </a:pPr>
+            <a:r>
+              <a:rPr lang="sr-Latn-RS" b="1" i="1">
+                <a:cs typeface="Calibri" panose="020F0502020204030204"/>
+              </a:rPr>
+              <a:t>unique_ptr</a:t>
+            </a:r>
+            <a:endParaRPr lang="sr-Latn-RS" b="1" dirty="0">
+              <a:cs typeface="Calibri" panose="020F0502020204030204"/>
+            </a:endParaRPr>
+          </a:p>
+          <a:p>
+            <a:pPr marL="0" indent="0" algn="ctr">
+              <a:buNone/>
+            </a:pPr>
+            <a:endParaRPr lang="sr-Latn-RS" sz="2000" b="1" i="1" dirty="0">
+              <a:cs typeface="Calibri" panose="020F0502020204030204"/>
+            </a:endParaRPr>
+          </a:p>
+          <a:p>
             <a:pPr marL="0" indent="0" algn="just">
               <a:buNone/>
             </a:pPr>
             <a:r>
-              <a:rPr lang="sr-Latn-RS" b="1">
-                <a:cs typeface="Calibri" panose="020F0502020204030204"/>
-              </a:rPr>
-              <a:t>Funkcije:</a:t>
-            </a:r>
-            <a:endParaRPr lang="sr-Latn-RS" b="1" i="1" dirty="0">
-              <a:cs typeface="Calibri" panose="020F0502020204030204"/>
-            </a:endParaRPr>
+              <a:rPr lang="sr-Latn-RS" sz="2000" b="1" i="1" dirty="0">
+                <a:cs typeface="Calibri" panose="020F0502020204030204"/>
+              </a:rPr>
+              <a:t>unique_ptr </a:t>
+            </a:r>
+            <a:r>
+              <a:rPr lang="sr-Latn-RS" sz="2000" dirty="0">
+                <a:cs typeface="Calibri" panose="020F0502020204030204"/>
+              </a:rPr>
+              <a:t>se pojavio u standardu C++11, kao zamena za </a:t>
+            </a:r>
+            <a:r>
+              <a:rPr lang="sr-Latn-RS" sz="2000" b="1" i="1" dirty="0">
+                <a:cs typeface="Calibri" panose="020F0502020204030204"/>
+              </a:rPr>
+              <a:t>auto_ptr</a:t>
+            </a:r>
+            <a:r>
+              <a:rPr lang="sr-Latn-RS" sz="2000" dirty="0">
+                <a:cs typeface="Calibri" panose="020F0502020204030204"/>
+              </a:rPr>
+              <a:t>, ima slične funkcionalnosti sa poboljšanom sigurnošću, dodatnim funkcijama i podrškom za rad da nizovima. Ovi pokazivači dozvoljavaju samo jednog vlasnika nad resursom. Kada se koristi </a:t>
+            </a:r>
+            <a:r>
+              <a:rPr lang="sr-Latn-RS" sz="2000" b="1" i="1" dirty="0">
+                <a:cs typeface="Calibri" panose="020F0502020204030204"/>
+              </a:rPr>
+              <a:t>unique_ptr</a:t>
+            </a:r>
+            <a:r>
+              <a:rPr lang="sr-Latn-RS" sz="2000" dirty="0">
+                <a:cs typeface="Calibri" panose="020F0502020204030204"/>
+              </a:rPr>
+              <a:t>, može postojati samo jedan takav pokazivač nad tim resursom i kada se taj pokazivač uništi, resurs se oslobađa. </a:t>
+            </a:r>
+            <a:r>
+              <a:rPr lang="sr-Latn-RS" sz="2000">
+                <a:cs typeface="Calibri" panose="020F0502020204030204"/>
+              </a:rPr>
+              <a:t>Pošto podržavaju politiku jednog vlasnika, pokušaj kopiranja prouzvokovaće grešku prilikom kompajliranja.</a:t>
+            </a:r>
           </a:p>
           <a:p>
             <a:pPr marL="0" indent="0" algn="just">
               <a:buNone/>
             </a:pPr>
-            <a:r>
-              <a:rPr lang="sr-Latn-RS">
-                <a:cs typeface="Calibri" panose="020F0502020204030204"/>
-              </a:rPr>
-              <a:t>- get</a:t>
-            </a:r>
-            <a:endParaRPr lang="sr-Latn-RS" b="1" dirty="0">
-              <a:cs typeface="Calibri" panose="020F0502020204030204"/>
-            </a:endParaRPr>
-          </a:p>
-          <a:p>
-            <a:pPr marL="0" indent="0" algn="just">
-              <a:buNone/>
-            </a:pPr>
-            <a:r>
-              <a:rPr lang="sr-Latn-RS">
-                <a:cs typeface="Calibri" panose="020F0502020204030204"/>
-              </a:rPr>
-              <a:t>- release</a:t>
-            </a:r>
-            <a:endParaRPr lang="sr-Latn-RS" dirty="0">
-              <a:cs typeface="Calibri" panose="020F0502020204030204"/>
-            </a:endParaRPr>
-          </a:p>
-          <a:p>
-            <a:pPr marL="0" indent="0" algn="just">
-              <a:buNone/>
-            </a:pPr>
-            <a:r>
-              <a:rPr lang="sr-Latn-RS">
-                <a:cs typeface="Calibri" panose="020F0502020204030204"/>
-              </a:rPr>
-              <a:t>- reset</a:t>
-            </a:r>
-            <a:endParaRPr lang="sr-Latn-RS" dirty="0">
-              <a:cs typeface="Calibri" panose="020F0502020204030204"/>
-            </a:endParaRPr>
-          </a:p>
-          <a:p>
-            <a:pPr marL="0" indent="0" algn="just">
-              <a:buNone/>
-            </a:pPr>
-            <a:r>
-              <a:rPr lang="sr-Latn-RS">
-                <a:cs typeface="Calibri" panose="020F0502020204030204"/>
-              </a:rPr>
-              <a:t>- swap</a:t>
-            </a:r>
-            <a:endParaRPr lang="sr-Latn-RS" dirty="0">
-              <a:cs typeface="Calibri" panose="020F0502020204030204"/>
-            </a:endParaRPr>
-          </a:p>
-          <a:p>
-            <a:pPr marL="0" indent="0" algn="just">
-              <a:buNone/>
-            </a:pPr>
-            <a:r>
-              <a:rPr lang="sr-Latn-RS" b="1">
-                <a:cs typeface="Calibri" panose="020F0502020204030204"/>
-              </a:rPr>
-              <a:t>Operatori:</a:t>
-            </a:r>
-            <a:endParaRPr lang="sr-Latn-RS" dirty="0">
-              <a:cs typeface="Calibri" panose="020F0502020204030204"/>
-            </a:endParaRPr>
-          </a:p>
-          <a:p>
-            <a:pPr marL="0" indent="0" algn="just">
-              <a:buNone/>
-            </a:pPr>
-            <a:r>
-              <a:rPr lang="sr-Latn-RS">
-                <a:cs typeface="Calibri" panose="020F0502020204030204"/>
-              </a:rPr>
-              <a:t>- *</a:t>
-            </a:r>
-            <a:endParaRPr lang="sr-Latn-RS" b="1" dirty="0">
-              <a:cs typeface="Calibri" panose="020F0502020204030204"/>
-            </a:endParaRPr>
-          </a:p>
-          <a:p>
-            <a:pPr marL="0" indent="0" algn="just">
-              <a:buNone/>
-            </a:pPr>
-            <a:r>
-              <a:rPr lang="sr-Latn-RS">
-                <a:cs typeface="Calibri" panose="020F0502020204030204"/>
-              </a:rPr>
-              <a:t>- -&gt;</a:t>
-            </a:r>
-            <a:endParaRPr lang="sr-Latn-RS" dirty="0">
-              <a:cs typeface="Calibri" panose="020F0502020204030204"/>
-            </a:endParaRPr>
-          </a:p>
-          <a:p>
-            <a:pPr marL="0" indent="0" algn="just">
-              <a:buNone/>
-            </a:pPr>
-            <a:r>
-              <a:rPr lang="sr-Latn-RS">
-                <a:ea typeface="+mn-lt"/>
-                <a:cs typeface="+mn-lt"/>
-              </a:rPr>
-              <a:t>- []</a:t>
-            </a:r>
-            <a:endParaRPr lang="sr-Latn-RS" dirty="0">
+            <a:endParaRPr lang="sr-Latn-RS" sz="2000" dirty="0">
               <a:ea typeface="+mn-lt"/>
               <a:cs typeface="+mn-lt"/>
             </a:endParaRPr>
           </a:p>
           <a:p>
+            <a:pPr marL="0" indent="0" algn="just">
+              <a:buNone/>
+            </a:pPr>
+            <a:endParaRPr lang="sr-Latn-RS" dirty="0">
+              <a:cs typeface="Calibri" panose="020F0502020204030204"/>
+            </a:endParaRPr>
+          </a:p>
+          <a:p>
+            <a:pPr marL="0" indent="0" algn="just">
+              <a:buNone/>
+            </a:pPr>
+            <a:endParaRPr lang="sr-Latn-RS" b="1" i="1" dirty="0">
+              <a:cs typeface="Calibri" panose="020F0502020204030204"/>
+            </a:endParaRPr>
+          </a:p>
+          <a:p>
             <a:pPr marL="0" indent="0" algn="ctr">
               <a:buNone/>
             </a:pPr>
-            <a:endParaRPr lang="sr-Latn-RS" sz="2000" b="1" i="1" dirty="0">
+            <a:endParaRPr lang="sr-Latn-RS" b="1" i="1" dirty="0">
               <a:cs typeface="Calibri" panose="020F0502020204030204"/>
             </a:endParaRPr>
           </a:p>
@@ -22782,12 +22664,20 @@
             <a:pPr marL="0" indent="0" algn="just">
               <a:buNone/>
             </a:pPr>
+            <a:endParaRPr lang="sr-Latn-RS" b="1" dirty="0">
+              <a:cs typeface="Calibri" panose="020F0502020204030204"/>
+            </a:endParaRPr>
+          </a:p>
+          <a:p>
+            <a:pPr marL="0" indent="0" algn="just">
+              <a:buNone/>
+            </a:pPr>
             <a:endParaRPr lang="sr-Latn-RS" sz="2000" dirty="0">
               <a:cs typeface="Calibri" panose="020F0502020204030204"/>
             </a:endParaRPr>
           </a:p>
           <a:p>
-            <a:pPr marL="0" indent="0" algn="just">
+            <a:pPr marL="0" indent="0" algn="ctr">
               <a:buNone/>
             </a:pPr>
             <a:endParaRPr lang="sr-Latn-RS" sz="2000" dirty="0">
@@ -22795,80 +22685,62 @@
             </a:endParaRPr>
           </a:p>
           <a:p>
-            <a:pPr marL="0" indent="0" algn="just">
-              <a:buNone/>
-            </a:pPr>
-            <a:endParaRPr lang="sr-Latn-RS" dirty="0">
-              <a:cs typeface="Calibri" panose="020F0502020204030204"/>
-            </a:endParaRPr>
-          </a:p>
-          <a:p>
-            <a:pPr marL="0" indent="0" algn="just">
+            <a:pPr marL="0" indent="0" algn="ctr">
               <a:buNone/>
             </a:pPr>
             <a:endParaRPr lang="sr-Latn-RS" b="1" i="1" dirty="0">
               <a:cs typeface="Calibri" panose="020F0502020204030204"/>
             </a:endParaRPr>
           </a:p>
-          <a:p>
-            <a:pPr marL="0" indent="0" algn="ctr">
-              <a:buNone/>
-            </a:pPr>
-            <a:endParaRPr lang="sr-Latn-RS" b="1" i="1" dirty="0">
-              <a:cs typeface="Calibri" panose="020F0502020204030204"/>
-            </a:endParaRPr>
-          </a:p>
-          <a:p>
-            <a:pPr marL="0" indent="0" algn="just">
-              <a:buNone/>
-            </a:pPr>
-            <a:endParaRPr lang="sr-Latn-RS" b="1" dirty="0">
-              <a:cs typeface="Calibri" panose="020F0502020204030204"/>
-            </a:endParaRPr>
-          </a:p>
-          <a:p>
-            <a:pPr marL="0" indent="0" algn="just">
-              <a:buNone/>
-            </a:pPr>
-            <a:endParaRPr lang="sr-Latn-RS" sz="2000" dirty="0">
-              <a:cs typeface="Calibri" panose="020F0502020204030204"/>
-            </a:endParaRPr>
-          </a:p>
-          <a:p>
-            <a:pPr marL="0" indent="0" algn="ctr">
-              <a:buNone/>
-            </a:pPr>
-            <a:endParaRPr lang="sr-Latn-RS" sz="2000" dirty="0">
-              <a:cs typeface="Calibri" panose="020F0502020204030204"/>
-            </a:endParaRPr>
-          </a:p>
-          <a:p>
-            <a:pPr marL="0" indent="0" algn="ctr">
-              <a:buNone/>
-            </a:pPr>
-            <a:endParaRPr lang="sr-Latn-RS" b="1" i="1" dirty="0">
-              <a:cs typeface="Calibri" panose="020F0502020204030204"/>
-            </a:endParaRPr>
-          </a:p>
-        </p:txBody>
-      </p:sp>
+        </p:txBody>
+      </p:sp>
+      <p:pic>
+        <p:nvPicPr>
+          <p:cNvPr id="4" name="Slika 4" descr="Slika na kojoj se nalazi tekst&#10;&#10;Opis je automatski generisan">
+            <a:extLst>
+              <a:ext uri="{FF2B5EF4-FFF2-40B4-BE49-F238E27FC236}">
+                <a16:creationId xmlns:a16="http://schemas.microsoft.com/office/drawing/2014/main" id="{2E5296C4-C028-45A6-9841-EF6CEABDDCB5}"/>
+              </a:ext>
+            </a:extLst>
+          </p:cNvPr>
+          <p:cNvPicPr>
+            <a:picLocks noChangeAspect="1"/>
+          </p:cNvPicPr>
+          <p:nvPr/>
+        </p:nvPicPr>
+        <p:blipFill>
+          <a:blip r:embed="rId2"/>
+          <a:stretch>
+            <a:fillRect/>
+          </a:stretch>
+        </p:blipFill>
+        <p:spPr>
+          <a:xfrm>
+            <a:off x="3242153" y="4672457"/>
+            <a:ext cx="6166980" cy="1343963"/>
+          </a:xfrm>
+          <a:prstGeom prst="rect">
+            <a:avLst/>
+          </a:prstGeom>
+        </p:spPr>
+      </p:pic>
     </p:spTree>
     <p:extLst>
       <p:ext uri="{BB962C8B-B14F-4D97-AF65-F5344CB8AC3E}">
-        <p14:creationId xmlns:p14="http://schemas.microsoft.com/office/powerpoint/2010/main" val="2399351738"/>
+        <p14:creationId xmlns:p14="http://schemas.microsoft.com/office/powerpoint/2010/main" val="13777408"/>
       </p:ext>
     </p:extLst>
   </p:cSld>
   <p:clrMapOvr>
     <a:masterClrMapping/>
   </p:clrMapOvr>
-  <mc:AlternateContent xmlns:mc="http://schemas.openxmlformats.org/markup-compatibility/2006">
-    <mc:Choice xmlns:p14="http://schemas.microsoft.com/office/powerpoint/2010/main" Requires="p14">
+  <mc:AlternateContent xmlns:mc="http://schemas.openxmlformats.org/markup-compatibility/2006" xmlns:p14="http://schemas.microsoft.com/office/powerpoint/2010/main">
+    <mc:Choice Requires="p14">
       <p:transition spd="slow" p14:dur="3900">
         <p14:glitter pattern="hexagon"/>
       </p:transition>
     </mc:Choice>
-    <mc:Fallback>
+    <mc:Fallback xmlns="">
       <p:transition spd="slow">
         <p:fade/>
       </p:transition>
@@ -23344,21 +23216,133 @@
         </p:spPr>
         <p:txBody>
           <a:bodyPr vert="horz" lIns="91440" tIns="45720" rIns="91440" bIns="45720" rtlCol="0" anchor="t">
-            <a:normAutofit/>
+            <a:normAutofit lnSpcReduction="10000"/>
           </a:bodyPr>
           <a:lstStyle/>
           <a:p>
-            <a:pPr marL="0" indent="0" algn="ctr">
-              <a:buNone/>
-            </a:pPr>
-            <a:r>
-              <a:rPr lang="sr-Latn-RS" b="1" i="1">
+            <a:pPr marL="0" indent="0" algn="just">
+              <a:buNone/>
+            </a:pPr>
+            <a:r>
+              <a:rPr lang="sr-Latn-RS" b="1">
+                <a:cs typeface="Calibri" panose="020F0502020204030204"/>
+              </a:rPr>
+              <a:t>Funkcije:</a:t>
+            </a:r>
+            <a:endParaRPr lang="sr-Latn-RS" b="1" i="1" dirty="0">
+              <a:cs typeface="Calibri" panose="020F0502020204030204"/>
+            </a:endParaRPr>
+          </a:p>
+          <a:p>
+            <a:pPr marL="0" indent="0" algn="just">
+              <a:buNone/>
+            </a:pPr>
+            <a:r>
+              <a:rPr lang="sr-Latn-RS">
+                <a:cs typeface="Calibri" panose="020F0502020204030204"/>
+              </a:rPr>
+              <a:t>- get</a:t>
+            </a:r>
+            <a:endParaRPr lang="sr-Latn-RS" b="1" dirty="0">
+              <a:cs typeface="Calibri" panose="020F0502020204030204"/>
+            </a:endParaRPr>
+          </a:p>
+          <a:p>
+            <a:pPr marL="0" indent="0" algn="just">
+              <a:buNone/>
+            </a:pPr>
+            <a:r>
+              <a:rPr lang="sr-Latn-RS">
+                <a:cs typeface="Calibri" panose="020F0502020204030204"/>
+              </a:rPr>
+              <a:t>- release</a:t>
+            </a:r>
+            <a:endParaRPr lang="sr-Latn-RS" dirty="0">
+              <a:cs typeface="Calibri" panose="020F0502020204030204"/>
+            </a:endParaRPr>
+          </a:p>
+          <a:p>
+            <a:pPr marL="0" indent="0" algn="just">
+              <a:buNone/>
+            </a:pPr>
+            <a:r>
+              <a:rPr lang="sr-Latn-RS">
+                <a:cs typeface="Calibri" panose="020F0502020204030204"/>
+              </a:rPr>
+              <a:t>- reset</a:t>
+            </a:r>
+            <a:endParaRPr lang="sr-Latn-RS" dirty="0">
+              <a:cs typeface="Calibri" panose="020F0502020204030204"/>
+            </a:endParaRPr>
+          </a:p>
+          <a:p>
+            <a:pPr marL="0" indent="0" algn="just">
+              <a:buNone/>
+            </a:pPr>
+            <a:r>
+              <a:rPr lang="sr-Latn-RS">
+                <a:cs typeface="Calibri" panose="020F0502020204030204"/>
+              </a:rPr>
+              <a:t>- swap</a:t>
+            </a:r>
+            <a:endParaRPr lang="sr-Latn-RS" dirty="0">
+              <a:cs typeface="Calibri" panose="020F0502020204030204"/>
+            </a:endParaRPr>
+          </a:p>
+          <a:p>
+            <a:pPr marL="0" indent="0" algn="just">
+              <a:buNone/>
+            </a:pPr>
+            <a:r>
+              <a:rPr lang="sr-Latn-RS" b="1">
+                <a:cs typeface="Calibri" panose="020F0502020204030204"/>
+              </a:rPr>
+              <a:t>Operatori:</a:t>
+            </a:r>
+            <a:endParaRPr lang="sr-Latn-RS" dirty="0">
+              <a:cs typeface="Calibri" panose="020F0502020204030204"/>
+            </a:endParaRPr>
+          </a:p>
+          <a:p>
+            <a:pPr marL="0" indent="0" algn="just">
+              <a:buNone/>
+            </a:pPr>
+            <a:r>
+              <a:rPr lang="sr-Latn-RS">
+                <a:cs typeface="Calibri" panose="020F0502020204030204"/>
+              </a:rPr>
+              <a:t>- *</a:t>
+            </a:r>
+            <a:endParaRPr lang="sr-Latn-RS" b="1" dirty="0">
+              <a:cs typeface="Calibri" panose="020F0502020204030204"/>
+            </a:endParaRPr>
+          </a:p>
+          <a:p>
+            <a:pPr marL="0" indent="0" algn="just">
+              <a:buNone/>
+            </a:pPr>
+            <a:r>
+              <a:rPr lang="sr-Latn-RS">
+                <a:cs typeface="Calibri" panose="020F0502020204030204"/>
+              </a:rPr>
+              <a:t>- -&gt;</a:t>
+            </a:r>
+            <a:endParaRPr lang="sr-Latn-RS" dirty="0">
+              <a:cs typeface="Calibri" panose="020F0502020204030204"/>
+            </a:endParaRPr>
+          </a:p>
+          <a:p>
+            <a:pPr marL="0" indent="0" algn="just">
+              <a:buNone/>
+            </a:pPr>
+            <a:r>
+              <a:rPr lang="sr-Latn-RS">
                 <a:ea typeface="+mn-lt"/>
                 <a:cs typeface="+mn-lt"/>
               </a:rPr>
-              <a:t>shared_ptr</a:t>
-            </a:r>
-            <a:endParaRPr lang="sr-Latn-RS" b="1" dirty="0">
+              <a:t>- []</a:t>
+            </a:r>
+            <a:endParaRPr lang="sr-Latn-RS" dirty="0">
               <a:ea typeface="+mn-lt"/>
               <a:cs typeface="+mn-lt"/>
             </a:endParaRPr>
@@ -23375,48 +23359,9 @@
             <a:pPr marL="0" indent="0" algn="just">
               <a:buNone/>
             </a:pPr>
-            <a:r>
-              <a:rPr lang="sr-Latn-RS" sz="2000" b="1" i="1" dirty="0">
-                <a:cs typeface="Calibri" panose="020F0502020204030204"/>
-              </a:rPr>
-              <a:t>shared_ptr</a:t>
-            </a:r>
-            <a:r>
-              <a:rPr lang="sr-Latn-RS" sz="2000" dirty="0">
-                <a:cs typeface="Calibri" panose="020F0502020204030204"/>
-              </a:rPr>
-              <a:t> je vrsta pokazivača koja se zasniva na </a:t>
-            </a:r>
-            <a:r>
-              <a:rPr lang="sr-Latn-RS" sz="2000" b="1" i="1" dirty="0">
-                <a:cs typeface="Calibri" panose="020F0502020204030204"/>
-              </a:rPr>
-              <a:t>unique_ptr</a:t>
-            </a:r>
-            <a:r>
-              <a:rPr lang="sr-Latn-RS" sz="2000" dirty="0">
-                <a:cs typeface="Calibri" panose="020F0502020204030204"/>
-              </a:rPr>
-              <a:t> i za razliku od njih podržavaju više vlasnika nad istim resursom. Ova vrsta pokazivača sadrži brojač referenci. Brojač referenci nad jednim resursom održava se u saradnji sa svim primercima </a:t>
-            </a:r>
-            <a:r>
-              <a:rPr lang="sr-Latn-RS" sz="2000" b="1" i="1" dirty="0">
-                <a:cs typeface="Calibri" panose="020F0502020204030204"/>
-              </a:rPr>
-              <a:t>shared_ptr</a:t>
-            </a:r>
-            <a:r>
-              <a:rPr lang="sr-Latn-RS" sz="2000" dirty="0">
-                <a:cs typeface="Calibri" panose="020F0502020204030204"/>
-              </a:rPr>
-              <a:t> pokazivača koji ukazuju na taj resurs. Dakle, brojač referenci se inkrementira svaki put kada novi pokazivač poveže sa </a:t>
-            </a:r>
-            <a:r>
-              <a:rPr lang="sr-Latn-RS" sz="2000">
-                <a:cs typeface="Calibri" panose="020F0502020204030204"/>
-              </a:rPr>
-              <a:t>resursom, a dekrementira kada se pokazivač ukloni.</a:t>
-            </a:r>
+            <a:endParaRPr lang="sr-Latn-RS" sz="2000" dirty="0">
+              <a:cs typeface="Calibri" panose="020F0502020204030204"/>
+            </a:endParaRPr>
           </a:p>
           <a:p>
             <a:pPr marL="0" indent="0" algn="just">
@@ -23430,12 +23375,44 @@
             <a:pPr marL="0" indent="0" algn="just">
               <a:buNone/>
             </a:pPr>
+            <a:endParaRPr lang="sr-Latn-RS" dirty="0">
+              <a:cs typeface="Calibri" panose="020F0502020204030204"/>
+            </a:endParaRPr>
+          </a:p>
+          <a:p>
+            <a:pPr marL="0" indent="0" algn="just">
+              <a:buNone/>
+            </a:pPr>
+            <a:endParaRPr lang="sr-Latn-RS" b="1" i="1" dirty="0">
+              <a:cs typeface="Calibri" panose="020F0502020204030204"/>
+            </a:endParaRPr>
+          </a:p>
+          <a:p>
+            <a:pPr marL="0" indent="0" algn="ctr">
+              <a:buNone/>
+            </a:pPr>
+            <a:endParaRPr lang="sr-Latn-RS" b="1" i="1" dirty="0">
+              <a:cs typeface="Calibri" panose="020F0502020204030204"/>
+            </a:endParaRPr>
+          </a:p>
+          <a:p>
+            <a:pPr marL="0" indent="0" algn="just">
+              <a:buNone/>
+            </a:pPr>
+            <a:endParaRPr lang="sr-Latn-RS" b="1" dirty="0">
+              <a:cs typeface="Calibri" panose="020F0502020204030204"/>
+            </a:endParaRPr>
+          </a:p>
+          <a:p>
+            <a:pPr marL="0" indent="0" algn="just">
+              <a:buNone/>
+            </a:pPr>
             <a:endParaRPr lang="sr-Latn-RS" sz="2000" dirty="0">
               <a:cs typeface="Calibri" panose="020F0502020204030204"/>
             </a:endParaRPr>
           </a:p>
           <a:p>
-            <a:pPr marL="0" indent="0" algn="just">
+            <a:pPr marL="0" indent="0" algn="ctr">
               <a:buNone/>
             </a:pPr>
             <a:endParaRPr lang="sr-Latn-RS" sz="2000" dirty="0">
@@ -23443,110 +23420,32 @@
             </a:endParaRPr>
           </a:p>
           <a:p>
-            <a:pPr marL="0" indent="0" algn="just">
-              <a:buNone/>
-            </a:pPr>
-            <a:endParaRPr lang="sr-Latn-RS" dirty="0">
-              <a:cs typeface="Calibri" panose="020F0502020204030204"/>
-            </a:endParaRPr>
-          </a:p>
-          <a:p>
-            <a:pPr marL="0" indent="0" algn="just">
+            <a:pPr marL="0" indent="0" algn="ctr">
               <a:buNone/>
             </a:pPr>
             <a:endParaRPr lang="sr-Latn-RS" b="1" i="1" dirty="0">
               <a:cs typeface="Calibri" panose="020F0502020204030204"/>
             </a:endParaRPr>
           </a:p>
-          <a:p>
-            <a:pPr marL="0" indent="0" algn="ctr">
-              <a:buNone/>
-            </a:pPr>
-            <a:endParaRPr lang="sr-Latn-RS" b="1" i="1" dirty="0">
-              <a:cs typeface="Calibri" panose="020F0502020204030204"/>
-            </a:endParaRPr>
-          </a:p>
-          <a:p>
-            <a:pPr marL="0" indent="0" algn="just">
-              <a:buNone/>
-            </a:pPr>
-            <a:endParaRPr lang="sr-Latn-RS" b="1" dirty="0">
-              <a:cs typeface="Calibri" panose="020F0502020204030204"/>
-            </a:endParaRPr>
-          </a:p>
-          <a:p>
-            <a:pPr marL="0" indent="0" algn="just">
-              <a:buNone/>
-            </a:pPr>
-            <a:endParaRPr lang="sr-Latn-RS" sz="2000" dirty="0">
-              <a:cs typeface="Calibri" panose="020F0502020204030204"/>
-            </a:endParaRPr>
-          </a:p>
-          <a:p>
-            <a:pPr marL="0" indent="0" algn="ctr">
-              <a:buNone/>
-            </a:pPr>
-            <a:endParaRPr lang="sr-Latn-RS" sz="2000" dirty="0">
-              <a:cs typeface="Calibri" panose="020F0502020204030204"/>
-            </a:endParaRPr>
-          </a:p>
-          <a:p>
-            <a:pPr marL="0" indent="0" algn="ctr">
-              <a:buNone/>
-            </a:pPr>
-            <a:endParaRPr lang="sr-Latn-RS" b="1" i="1" dirty="0">
-              <a:cs typeface="Calibri" panose="020F0502020204030204"/>
-            </a:endParaRPr>
-          </a:p>
-        </p:txBody>
-      </p:sp>
-      <p:pic>
-        <p:nvPicPr>
-          <p:cNvPr id="4" name="Slika 4" descr="Slika na kojoj se nalazi tekst&#10;&#10;Opis je automatski generisan">
-            <a:extLst>
-              <a:ext uri="{FF2B5EF4-FFF2-40B4-BE49-F238E27FC236}">
-                <a16:creationId xmlns:a16="http://schemas.microsoft.com/office/drawing/2014/main" id="{30A74301-F066-4185-87C3-68A97F71390C}"/>
-              </a:ext>
-            </a:extLst>
-          </p:cNvPr>
-          <p:cNvPicPr>
-            <a:picLocks noChangeAspect="1"/>
-          </p:cNvPicPr>
-          <p:nvPr/>
-        </p:nvPicPr>
-        <p:blipFill>
-          <a:blip r:embed="rId2"/>
-          <a:stretch>
-            <a:fillRect/>
-          </a:stretch>
-        </p:blipFill>
-        <p:spPr>
-          <a:xfrm>
-            <a:off x="3428010" y="4424258"/>
-            <a:ext cx="5467610" cy="1634169"/>
-          </a:xfrm>
-          <a:prstGeom prst="rect">
-            <a:avLst/>
-          </a:prstGeom>
-        </p:spPr>
-      </p:pic>
+        </p:txBody>
+      </p:sp>
     </p:spTree>
     <p:extLst>
       <p:ext uri="{BB962C8B-B14F-4D97-AF65-F5344CB8AC3E}">
-        <p14:creationId xmlns:p14="http://schemas.microsoft.com/office/powerpoint/2010/main" val="3776780028"/>
+        <p14:creationId xmlns:p14="http://schemas.microsoft.com/office/powerpoint/2010/main" val="2399351738"/>
       </p:ext>
     </p:extLst>
   </p:cSld>
   <p:clrMapOvr>
     <a:masterClrMapping/>
   </p:clrMapOvr>
-  <mc:AlternateContent xmlns:mc="http://schemas.openxmlformats.org/markup-compatibility/2006">
-    <mc:Choice xmlns:p14="http://schemas.microsoft.com/office/powerpoint/2010/main" Requires="p14">
+  <mc:AlternateContent xmlns:mc="http://schemas.openxmlformats.org/markup-compatibility/2006" xmlns:p14="http://schemas.microsoft.com/office/powerpoint/2010/main">
+    <mc:Choice Requires="p14">
       <p:transition spd="slow" p14:dur="3900">
         <p14:glitter pattern="hexagon"/>
       </p:transition>
     </mc:Choice>
-    <mc:Fallback>
+    <mc:Fallback xmlns="">
       <p:transition spd="slow">
         <p:fade/>
       </p:transition>
@@ -24022,147 +23921,21 @@
         </p:spPr>
         <p:txBody>
           <a:bodyPr vert="horz" lIns="91440" tIns="45720" rIns="91440" bIns="45720" rtlCol="0" anchor="t">
-            <a:normAutofit fontScale="92500" lnSpcReduction="10000"/>
+            <a:normAutofit/>
           </a:bodyPr>
           <a:lstStyle/>
           <a:p>
-            <a:pPr marL="0" indent="0" algn="just">
-              <a:buNone/>
-            </a:pPr>
-            <a:r>
-              <a:rPr lang="sr-Latn-RS" b="1">
-                <a:cs typeface="Calibri" panose="020F0502020204030204"/>
-              </a:rPr>
-              <a:t>Funkcije:</a:t>
-            </a:r>
-            <a:endParaRPr lang="sr-Latn-RS" b="1" i="1" dirty="0">
-              <a:cs typeface="Calibri" panose="020F0502020204030204"/>
-            </a:endParaRPr>
-          </a:p>
-          <a:p>
-            <a:pPr marL="0" indent="0" algn="just">
-              <a:buNone/>
-            </a:pPr>
-            <a:r>
-              <a:rPr lang="sr-Latn-RS">
-                <a:cs typeface="Calibri" panose="020F0502020204030204"/>
-              </a:rPr>
-              <a:t>- get</a:t>
-            </a:r>
-            <a:endParaRPr lang="sr-Latn-RS" b="1" dirty="0">
-              <a:cs typeface="Calibri" panose="020F0502020204030204"/>
-            </a:endParaRPr>
-          </a:p>
-          <a:p>
-            <a:pPr marL="0" indent="0" algn="just">
-              <a:buNone/>
-            </a:pPr>
-            <a:r>
-              <a:rPr lang="sr-Latn-RS">
-                <a:cs typeface="Calibri" panose="020F0502020204030204"/>
-              </a:rPr>
-              <a:t>- use_count</a:t>
-            </a:r>
-            <a:endParaRPr lang="sr-Latn-RS" dirty="0">
-              <a:cs typeface="Calibri" panose="020F0502020204030204"/>
-            </a:endParaRPr>
-          </a:p>
-          <a:p>
-            <a:pPr marL="0" indent="0" algn="just">
-              <a:buNone/>
-            </a:pPr>
-            <a:r>
-              <a:rPr lang="sr-Latn-RS">
-                <a:cs typeface="Calibri" panose="020F0502020204030204"/>
-              </a:rPr>
-              <a:t>- reset</a:t>
-            </a:r>
-            <a:endParaRPr lang="sr-Latn-RS" dirty="0">
-              <a:cs typeface="Calibri" panose="020F0502020204030204"/>
-            </a:endParaRPr>
-          </a:p>
-          <a:p>
-            <a:pPr marL="0" indent="0" algn="just">
-              <a:buNone/>
-            </a:pPr>
-            <a:r>
-              <a:rPr lang="sr-Latn-RS">
-                <a:cs typeface="Calibri" panose="020F0502020204030204"/>
-              </a:rPr>
-              <a:t>- swap</a:t>
-            </a:r>
-            <a:endParaRPr lang="sr-Latn-RS" dirty="0">
-              <a:cs typeface="Calibri" panose="020F0502020204030204"/>
-            </a:endParaRPr>
-          </a:p>
-          <a:p>
-            <a:pPr marL="0" indent="0" algn="just">
-              <a:buNone/>
-            </a:pPr>
-            <a:r>
-              <a:rPr lang="sr-Latn-RS">
-                <a:cs typeface="Calibri" panose="020F0502020204030204"/>
-              </a:rPr>
-              <a:t>- unique</a:t>
-            </a:r>
-            <a:endParaRPr lang="sr-Latn-RS" dirty="0">
-              <a:cs typeface="Calibri" panose="020F0502020204030204"/>
-            </a:endParaRPr>
-          </a:p>
-          <a:p>
-            <a:pPr marL="0" indent="0" algn="just">
-              <a:buNone/>
-            </a:pPr>
-            <a:r>
-              <a:rPr lang="sr-Latn-RS" b="1">
-                <a:cs typeface="Calibri" panose="020F0502020204030204"/>
-              </a:rPr>
-              <a:t>Operatori:</a:t>
-            </a:r>
-            <a:endParaRPr lang="sr-Latn-RS" dirty="0">
-              <a:cs typeface="Calibri" panose="020F0502020204030204"/>
-            </a:endParaRPr>
-          </a:p>
-          <a:p>
-            <a:pPr marL="0" indent="0" algn="just">
-              <a:buNone/>
-            </a:pPr>
-            <a:r>
-              <a:rPr lang="sr-Latn-RS">
-                <a:cs typeface="Calibri" panose="020F0502020204030204"/>
-              </a:rPr>
-              <a:t>- *</a:t>
-            </a:r>
-            <a:endParaRPr lang="sr-Latn-RS" b="1" dirty="0">
-              <a:cs typeface="Calibri" panose="020F0502020204030204"/>
-            </a:endParaRPr>
-          </a:p>
-          <a:p>
-            <a:pPr marL="0" indent="0" algn="just">
-              <a:buNone/>
-            </a:pPr>
-            <a:r>
-              <a:rPr lang="sr-Latn-RS">
-                <a:cs typeface="Calibri" panose="020F0502020204030204"/>
-              </a:rPr>
-              <a:t>- -&gt;</a:t>
-            </a:r>
-            <a:endParaRPr lang="sr-Latn-RS" dirty="0">
-              <a:cs typeface="Calibri" panose="020F0502020204030204"/>
-            </a:endParaRPr>
-          </a:p>
-          <a:p>
-            <a:pPr marL="0" indent="0" algn="just">
-              <a:buNone/>
-            </a:pPr>
-            <a:r>
-              <a:rPr lang="sr-Latn-RS">
+            <a:pPr marL="0" indent="0" algn="ctr">
+              <a:buNone/>
+            </a:pPr>
+            <a:r>
+              <a:rPr lang="sr-Latn-RS" b="1" i="1">
                 <a:ea typeface="+mn-lt"/>
                 <a:cs typeface="+mn-lt"/>
               </a:rPr>
-              <a:t>- []</a:t>
-            </a:r>
-            <a:endParaRPr lang="sr-Latn-RS" dirty="0">
+              <a:t>shared_ptr</a:t>
+            </a:r>
+            <a:endParaRPr lang="sr-Latn-RS" b="1" dirty="0">
               <a:ea typeface="+mn-lt"/>
               <a:cs typeface="+mn-lt"/>
             </a:endParaRPr>
@@ -24179,6 +23952,53 @@
             <a:pPr marL="0" indent="0" algn="just">
               <a:buNone/>
             </a:pPr>
+            <a:r>
+              <a:rPr lang="sr-Latn-RS" sz="2000" b="1" i="1" dirty="0">
+                <a:cs typeface="Calibri" panose="020F0502020204030204"/>
+              </a:rPr>
+              <a:t>shared_ptr</a:t>
+            </a:r>
+            <a:r>
+              <a:rPr lang="sr-Latn-RS" sz="2000" dirty="0">
+                <a:cs typeface="Calibri" panose="020F0502020204030204"/>
+              </a:rPr>
+              <a:t> je vrsta pokazivača koja se zasniva na </a:t>
+            </a:r>
+            <a:r>
+              <a:rPr lang="sr-Latn-RS" sz="2000" b="1" i="1" dirty="0">
+                <a:cs typeface="Calibri" panose="020F0502020204030204"/>
+              </a:rPr>
+              <a:t>unique_ptr</a:t>
+            </a:r>
+            <a:r>
+              <a:rPr lang="sr-Latn-RS" sz="2000" dirty="0">
+                <a:cs typeface="Calibri" panose="020F0502020204030204"/>
+              </a:rPr>
+              <a:t> i za razliku od njih podržavaju više vlasnika nad istim resursom. Ova vrsta pokazivača sadrži brojač referenci. Brojač referenci nad jednim resursom održava se u saradnji sa svim primercima </a:t>
+            </a:r>
+            <a:r>
+              <a:rPr lang="sr-Latn-RS" sz="2000" b="1" i="1" dirty="0">
+                <a:cs typeface="Calibri" panose="020F0502020204030204"/>
+              </a:rPr>
+              <a:t>shared_ptr</a:t>
+            </a:r>
+            <a:r>
+              <a:rPr lang="sr-Latn-RS" sz="2000" dirty="0">
+                <a:cs typeface="Calibri" panose="020F0502020204030204"/>
+              </a:rPr>
+              <a:t> pokazivača koji ukazuju na taj resurs. Dakle, brojač referenci se inkrementira svaki put kada novi pokazivač poveže sa </a:t>
+            </a:r>
+            <a:r>
+              <a:rPr lang="sr-Latn-RS" sz="2000">
+                <a:cs typeface="Calibri" panose="020F0502020204030204"/>
+              </a:rPr>
+              <a:t>resursom, a dekrementira kada se pokazivač ukloni.</a:t>
+            </a:r>
+          </a:p>
+          <a:p>
+            <a:pPr marL="0" indent="0" algn="just">
+              <a:buNone/>
+            </a:pPr>
             <a:endParaRPr lang="sr-Latn-RS" sz="2000" dirty="0">
               <a:cs typeface="Calibri" panose="020F0502020204030204"/>
             </a:endParaRPr>
@@ -24195,6 +24015,14 @@
             <a:pPr marL="0" indent="0" algn="just">
               <a:buNone/>
             </a:pPr>
+            <a:endParaRPr lang="sr-Latn-RS" sz="2000" dirty="0">
+              <a:cs typeface="Calibri" panose="020F0502020204030204"/>
+            </a:endParaRPr>
+          </a:p>
+          <a:p>
+            <a:pPr marL="0" indent="0" algn="just">
+              <a:buNone/>
+            </a:pPr>
             <a:endParaRPr lang="sr-Latn-RS" dirty="0">
               <a:cs typeface="Calibri" panose="020F0502020204030204"/>
             </a:endParaRPr>
@@ -24249,23 +24077,53 @@
           </a:p>
         </p:txBody>
       </p:sp>
+      <p:pic>
+        <p:nvPicPr>
+          <p:cNvPr id="4" name="Slika 4" descr="Slika na kojoj se nalazi tekst&#10;&#10;Opis je automatski generisan">
+            <a:extLst>
+              <a:ext uri="{FF2B5EF4-FFF2-40B4-BE49-F238E27FC236}">
+                <a16:creationId xmlns:a16="http://schemas.microsoft.com/office/drawing/2014/main" id="{30A74301-F066-4185-87C3-68A97F71390C}"/>
+              </a:ext>
+            </a:extLst>
+          </p:cNvPr>
+          <p:cNvPicPr>
+            <a:picLocks noChangeAspect="1"/>
+          </p:cNvPicPr>
+          <p:nvPr/>
+        </p:nvPicPr>
+        <p:blipFill>
+          <a:blip r:embed="rId2"/>
+          <a:stretch>
+            <a:fillRect/>
+          </a:stretch>
+        </p:blipFill>
+        <p:spPr>
+          <a:xfrm>
+            <a:off x="3428010" y="4424258"/>
+            <a:ext cx="5467610" cy="1634169"/>
+          </a:xfrm>
+          <a:prstGeom prst="rect">
+            <a:avLst/>
+          </a:prstGeom>
+        </p:spPr>
+      </p:pic>
     </p:spTree>
     <p:extLst>
       <p:ext uri="{BB962C8B-B14F-4D97-AF65-F5344CB8AC3E}">
-        <p14:creationId xmlns:p14="http://schemas.microsoft.com/office/powerpoint/2010/main" val="2883176372"/>
+        <p14:creationId xmlns:p14="http://schemas.microsoft.com/office/powerpoint/2010/main" val="3776780028"/>
       </p:ext>
     </p:extLst>
   </p:cSld>
   <p:clrMapOvr>
     <a:masterClrMapping/>
   </p:clrMapOvr>
-  <mc:AlternateContent xmlns:mc="http://schemas.openxmlformats.org/markup-compatibility/2006">
-    <mc:Choice xmlns:p14="http://schemas.microsoft.com/office/powerpoint/2010/main" Requires="p14">
+  <mc:AlternateContent xmlns:mc="http://schemas.openxmlformats.org/markup-compatibility/2006" xmlns:p14="http://schemas.microsoft.com/office/powerpoint/2010/main">
+    <mc:Choice Requires="p14">
       <p:transition spd="slow" p14:dur="3900">
         <p14:glitter pattern="hexagon"/>
       </p:transition>
     </mc:Choice>
-    <mc:Fallback>
+    <mc:Fallback xmlns="">
       <p:transition spd="slow">
         <p:fade/>
       </p:transition>
@@ -24741,21 +24599,147 @@
         </p:spPr>
         <p:txBody>
           <a:bodyPr vert="horz" lIns="91440" tIns="45720" rIns="91440" bIns="45720" rtlCol="0" anchor="t">
-            <a:normAutofit/>
+            <a:normAutofit fontScale="92500" lnSpcReduction="10000"/>
           </a:bodyPr>
           <a:lstStyle/>
           <a:p>
-            <a:pPr marL="0" indent="0" algn="ctr">
-              <a:buNone/>
-            </a:pPr>
-            <a:r>
-              <a:rPr lang="sr-Latn-RS" b="1" i="1">
+            <a:pPr marL="0" indent="0" algn="just">
+              <a:buNone/>
+            </a:pPr>
+            <a:r>
+              <a:rPr lang="sr-Latn-RS" b="1">
+                <a:cs typeface="Calibri" panose="020F0502020204030204"/>
+              </a:rPr>
+              <a:t>Funkcije:</a:t>
+            </a:r>
+            <a:endParaRPr lang="sr-Latn-RS" b="1" i="1" dirty="0">
+              <a:cs typeface="Calibri" panose="020F0502020204030204"/>
+            </a:endParaRPr>
+          </a:p>
+          <a:p>
+            <a:pPr marL="0" indent="0" algn="just">
+              <a:buNone/>
+            </a:pPr>
+            <a:r>
+              <a:rPr lang="sr-Latn-RS">
+                <a:cs typeface="Calibri" panose="020F0502020204030204"/>
+              </a:rPr>
+              <a:t>- get</a:t>
+            </a:r>
+            <a:endParaRPr lang="sr-Latn-RS" b="1" dirty="0">
+              <a:cs typeface="Calibri" panose="020F0502020204030204"/>
+            </a:endParaRPr>
+          </a:p>
+          <a:p>
+            <a:pPr marL="0" indent="0" algn="just">
+              <a:buNone/>
+            </a:pPr>
+            <a:r>
+              <a:rPr lang="sr-Latn-RS">
+                <a:cs typeface="Calibri" panose="020F0502020204030204"/>
+              </a:rPr>
+              <a:t>- use_count</a:t>
+            </a:r>
+            <a:endParaRPr lang="sr-Latn-RS" dirty="0">
+              <a:cs typeface="Calibri" panose="020F0502020204030204"/>
+            </a:endParaRPr>
+          </a:p>
+          <a:p>
+            <a:pPr marL="0" indent="0" algn="just">
+              <a:buNone/>
+            </a:pPr>
+            <a:r>
+              <a:rPr lang="sr-Latn-RS">
+                <a:cs typeface="Calibri" panose="020F0502020204030204"/>
+              </a:rPr>
+              <a:t>- reset</a:t>
+            </a:r>
+            <a:endParaRPr lang="sr-Latn-RS" dirty="0">
+              <a:cs typeface="Calibri" panose="020F0502020204030204"/>
+            </a:endParaRPr>
+          </a:p>
+          <a:p>
+            <a:pPr marL="0" indent="0" algn="just">
+              <a:buNone/>
+            </a:pPr>
+            <a:r>
+              <a:rPr lang="sr-Latn-RS">
+                <a:cs typeface="Calibri" panose="020F0502020204030204"/>
+              </a:rPr>
+              <a:t>- swap</a:t>
+            </a:r>
+            <a:endParaRPr lang="sr-Latn-RS" dirty="0">
+              <a:cs typeface="Calibri" panose="020F0502020204030204"/>
+            </a:endParaRPr>
+          </a:p>
+          <a:p>
+            <a:pPr marL="0" indent="0" algn="just">
+              <a:buNone/>
+            </a:pPr>
+            <a:r>
+              <a:rPr lang="sr-Latn-RS">
+                <a:cs typeface="Calibri" panose="020F0502020204030204"/>
+              </a:rPr>
+              <a:t>- unique</a:t>
+            </a:r>
+            <a:endParaRPr lang="sr-Latn-RS" dirty="0">
+              <a:cs typeface="Calibri" panose="020F0502020204030204"/>
+            </a:endParaRPr>
+          </a:p>
+          <a:p>
+            <a:pPr marL="0" indent="0" algn="just">
+              <a:buNone/>
+            </a:pPr>
+            <a:r>
+              <a:rPr lang="sr-Latn-RS" b="1">
+                <a:cs typeface="Calibri" panose="020F0502020204030204"/>
+              </a:rPr>
+              <a:t>Operatori:</a:t>
+            </a:r>
+            <a:endParaRPr lang="sr-Latn-RS" dirty="0">
+              <a:cs typeface="Calibri" panose="020F0502020204030204"/>
+            </a:endParaRPr>
+          </a:p>
+          <a:p>
+            <a:pPr marL="0" indent="0" algn="just">
+              <a:buNone/>
+            </a:pPr>
+            <a:r>
+              <a:rPr lang="sr-Latn-RS">
+                <a:cs typeface="Calibri" panose="020F0502020204030204"/>
+              </a:rPr>
+              <a:t>- *</a:t>
+            </a:r>
+            <a:endParaRPr lang="sr-Latn-RS" b="1" dirty="0">
+              <a:cs typeface="Calibri" panose="020F0502020204030204"/>
+            </a:endParaRPr>
+          </a:p>
+          <a:p>
+            <a:pPr marL="0" indent="0" algn="just">
+              <a:buNone/>
+            </a:pPr>
+            <a:r>
+              <a:rPr lang="sr-Latn-RS">
+                <a:cs typeface="Calibri" panose="020F0502020204030204"/>
+              </a:rPr>
+              <a:t>- -&gt;</a:t>
+            </a:r>
+            <a:endParaRPr lang="sr-Latn-RS" dirty="0">
+              <a:cs typeface="Calibri" panose="020F0502020204030204"/>
+            </a:endParaRPr>
+          </a:p>
+          <a:p>
+            <a:pPr marL="0" indent="0" algn="just">
+              <a:buNone/>
+            </a:pPr>
+            <a:r>
+              <a:rPr lang="sr-Latn-RS">
                 <a:ea typeface="+mn-lt"/>
                 <a:cs typeface="+mn-lt"/>
               </a:rPr>
-              <a:t>weak_ptr</a:t>
-            </a:r>
-            <a:endParaRPr lang="sr-Latn-RS" b="1" dirty="0">
+              <a:t>- []</a:t>
+            </a:r>
+            <a:endParaRPr lang="sr-Latn-RS" dirty="0">
               <a:ea typeface="+mn-lt"/>
               <a:cs typeface="+mn-lt"/>
             </a:endParaRPr>
@@ -24772,78 +24756,9 @@
             <a:pPr marL="0" indent="0" algn="just">
               <a:buNone/>
             </a:pPr>
-            <a:r>
-              <a:rPr lang="sr-Latn-RS" sz="2000" b="1" i="1" dirty="0">
-                <a:cs typeface="Calibri" panose="020F0502020204030204"/>
-              </a:rPr>
-              <a:t>weak_ptr</a:t>
-            </a:r>
-            <a:r>
-              <a:rPr lang="sr-Latn-RS" sz="2000" dirty="0">
-                <a:cs typeface="Calibri" panose="020F0502020204030204"/>
-              </a:rPr>
-              <a:t> je nastao kao kopija </a:t>
-            </a:r>
-            <a:r>
-              <a:rPr lang="sr-Latn-RS" sz="2000" b="1" i="1" dirty="0">
-                <a:cs typeface="Calibri" panose="020F0502020204030204"/>
-              </a:rPr>
-              <a:t>shared_ptr</a:t>
-            </a:r>
-            <a:r>
-              <a:rPr lang="sr-Latn-RS" sz="2000" dirty="0">
-                <a:cs typeface="Calibri" panose="020F0502020204030204"/>
-              </a:rPr>
-              <a:t>-a. Ovaj tip pokazivača pruža pristup objektu koji je u vlasništvu  jedne ili više instanci </a:t>
-            </a:r>
-            <a:r>
-              <a:rPr lang="sr-Latn-RS" sz="2000" b="1" i="1" dirty="0">
-                <a:cs typeface="Calibri" panose="020F0502020204030204"/>
-              </a:rPr>
-              <a:t>shared_ptr</a:t>
-            </a:r>
-            <a:r>
-              <a:rPr lang="sr-Latn-RS" sz="2000" dirty="0">
-                <a:cs typeface="Calibri" panose="020F0502020204030204"/>
-              </a:rPr>
-              <a:t>, ali ne učestvuje u brojanju referenci. Postojanje ili uništenje </a:t>
-            </a:r>
-            <a:r>
-              <a:rPr lang="sr-Latn-RS" sz="2000" b="1" i="1" dirty="0">
-                <a:cs typeface="Calibri" panose="020F0502020204030204"/>
-              </a:rPr>
-              <a:t>weak_ptr</a:t>
-            </a:r>
-            <a:r>
-              <a:rPr lang="sr-Latn-RS" sz="2000" dirty="0">
-                <a:cs typeface="Calibri" panose="020F0502020204030204"/>
-              </a:rPr>
-              <a:t>-a nema uticaja na </a:t>
-            </a:r>
-            <a:r>
-              <a:rPr lang="sr-Latn-RS" sz="2000" b="1" i="1" dirty="0">
-                <a:cs typeface="Calibri" panose="020F0502020204030204"/>
-              </a:rPr>
-              <a:t>shared_ptr</a:t>
-            </a:r>
-            <a:r>
-              <a:rPr lang="sr-Latn-RS" sz="2000">
-                <a:cs typeface="Calibri" panose="020F0502020204030204"/>
-              </a:rPr>
-              <a:t> ili njegove kopije. Glavni razlog uvođenja </a:t>
-            </a:r>
-            <a:r>
-              <a:rPr lang="sr-Latn-RS" sz="2000" b="1" i="1">
-                <a:cs typeface="Calibri" panose="020F0502020204030204"/>
-              </a:rPr>
-              <a:t>weak_ptr</a:t>
-            </a:r>
-            <a:r>
-              <a:rPr lang="sr-Latn-RS" sz="2000">
-                <a:cs typeface="Calibri" panose="020F0502020204030204"/>
-              </a:rPr>
-              <a:t>-a jeste problem cirkularnih referenci.</a:t>
-            </a:r>
+            <a:endParaRPr lang="sr-Latn-RS" sz="2000" dirty="0">
+              <a:cs typeface="Calibri" panose="020F0502020204030204"/>
+            </a:endParaRPr>
           </a:p>
           <a:p>
             <a:pPr marL="0" indent="0" algn="just">
@@ -24857,12 +24772,44 @@
             <a:pPr marL="0" indent="0" algn="just">
               <a:buNone/>
             </a:pPr>
+            <a:endParaRPr lang="sr-Latn-RS" dirty="0">
+              <a:cs typeface="Calibri" panose="020F0502020204030204"/>
+            </a:endParaRPr>
+          </a:p>
+          <a:p>
+            <a:pPr marL="0" indent="0" algn="just">
+              <a:buNone/>
+            </a:pPr>
+            <a:endParaRPr lang="sr-Latn-RS" b="1" i="1" dirty="0">
+              <a:cs typeface="Calibri" panose="020F0502020204030204"/>
+            </a:endParaRPr>
+          </a:p>
+          <a:p>
+            <a:pPr marL="0" indent="0" algn="ctr">
+              <a:buNone/>
+            </a:pPr>
+            <a:endParaRPr lang="sr-Latn-RS" b="1" i="1" dirty="0">
+              <a:cs typeface="Calibri" panose="020F0502020204030204"/>
+            </a:endParaRPr>
+          </a:p>
+          <a:p>
+            <a:pPr marL="0" indent="0" algn="just">
+              <a:buNone/>
+            </a:pPr>
+            <a:endParaRPr lang="sr-Latn-RS" b="1" dirty="0">
+              <a:cs typeface="Calibri" panose="020F0502020204030204"/>
+            </a:endParaRPr>
+          </a:p>
+          <a:p>
+            <a:pPr marL="0" indent="0" algn="just">
+              <a:buNone/>
+            </a:pPr>
             <a:endParaRPr lang="sr-Latn-RS" sz="2000" dirty="0">
               <a:cs typeface="Calibri" panose="020F0502020204030204"/>
             </a:endParaRPr>
           </a:p>
           <a:p>
-            <a:pPr marL="0" indent="0" algn="just">
+            <a:pPr marL="0" indent="0" algn="ctr">
               <a:buNone/>
             </a:pPr>
             <a:endParaRPr lang="sr-Latn-RS" sz="2000" dirty="0">
@@ -24870,110 +24817,32 @@
             </a:endParaRPr>
           </a:p>
           <a:p>
-            <a:pPr marL="0" indent="0" algn="just">
-              <a:buNone/>
-            </a:pPr>
-            <a:endParaRPr lang="sr-Latn-RS" dirty="0">
-              <a:cs typeface="Calibri" panose="020F0502020204030204"/>
-            </a:endParaRPr>
-          </a:p>
-          <a:p>
-            <a:pPr marL="0" indent="0" algn="just">
+            <a:pPr marL="0" indent="0" algn="ctr">
               <a:buNone/>
             </a:pPr>
             <a:endParaRPr lang="sr-Latn-RS" b="1" i="1" dirty="0">
               <a:cs typeface="Calibri" panose="020F0502020204030204"/>
             </a:endParaRPr>
           </a:p>
-          <a:p>
-            <a:pPr marL="0" indent="0" algn="ctr">
-              <a:buNone/>
-            </a:pPr>
-            <a:endParaRPr lang="sr-Latn-RS" b="1" i="1" dirty="0">
-              <a:cs typeface="Calibri" panose="020F0502020204030204"/>
-            </a:endParaRPr>
-          </a:p>
-          <a:p>
-            <a:pPr marL="0" indent="0" algn="just">
-              <a:buNone/>
-            </a:pPr>
-            <a:endParaRPr lang="sr-Latn-RS" b="1" dirty="0">
-              <a:cs typeface="Calibri" panose="020F0502020204030204"/>
-            </a:endParaRPr>
-          </a:p>
-          <a:p>
-            <a:pPr marL="0" indent="0" algn="just">
-              <a:buNone/>
-            </a:pPr>
-            <a:endParaRPr lang="sr-Latn-RS" sz="2000" dirty="0">
-              <a:cs typeface="Calibri" panose="020F0502020204030204"/>
-            </a:endParaRPr>
-          </a:p>
-          <a:p>
-            <a:pPr marL="0" indent="0" algn="ctr">
-              <a:buNone/>
-            </a:pPr>
-            <a:endParaRPr lang="sr-Latn-RS" sz="2000" dirty="0">
-              <a:cs typeface="Calibri" panose="020F0502020204030204"/>
-            </a:endParaRPr>
-          </a:p>
-          <a:p>
-            <a:pPr marL="0" indent="0" algn="ctr">
-              <a:buNone/>
-            </a:pPr>
-            <a:endParaRPr lang="sr-Latn-RS" b="1" i="1" dirty="0">
-              <a:cs typeface="Calibri" panose="020F0502020204030204"/>
-            </a:endParaRPr>
-          </a:p>
-        </p:txBody>
-      </p:sp>
-      <p:pic>
-        <p:nvPicPr>
-          <p:cNvPr id="4" name="Slika 4">
-            <a:extLst>
-              <a:ext uri="{FF2B5EF4-FFF2-40B4-BE49-F238E27FC236}">
-                <a16:creationId xmlns:a16="http://schemas.microsoft.com/office/drawing/2014/main" id="{9E8BE601-37A7-4E65-8148-3D32B8CA31F3}"/>
-              </a:ext>
-            </a:extLst>
-          </p:cNvPr>
-          <p:cNvPicPr>
-            <a:picLocks noChangeAspect="1"/>
-          </p:cNvPicPr>
-          <p:nvPr/>
-        </p:nvPicPr>
-        <p:blipFill>
-          <a:blip r:embed="rId2"/>
-          <a:stretch>
-            <a:fillRect/>
-          </a:stretch>
-        </p:blipFill>
-        <p:spPr>
-          <a:xfrm>
-            <a:off x="2220685" y="4024519"/>
-            <a:ext cx="8025008" cy="2178652"/>
-          </a:xfrm>
-          <a:prstGeom prst="rect">
-            <a:avLst/>
-          </a:prstGeom>
-        </p:spPr>
-      </p:pic>
+        </p:txBody>
+      </p:sp>
     </p:spTree>
     <p:extLst>
       <p:ext uri="{BB962C8B-B14F-4D97-AF65-F5344CB8AC3E}">
-        <p14:creationId xmlns:p14="http://schemas.microsoft.com/office/powerpoint/2010/main" val="814342036"/>
+        <p14:creationId xmlns:p14="http://schemas.microsoft.com/office/powerpoint/2010/main" val="2883176372"/>
       </p:ext>
     </p:extLst>
   </p:cSld>
   <p:clrMapOvr>
     <a:masterClrMapping/>
   </p:clrMapOvr>
-  <mc:AlternateContent xmlns:mc="http://schemas.openxmlformats.org/markup-compatibility/2006">
-    <mc:Choice xmlns:p14="http://schemas.microsoft.com/office/powerpoint/2010/main" Requires="p14">
+  <mc:AlternateContent xmlns:mc="http://schemas.openxmlformats.org/markup-compatibility/2006" xmlns:p14="http://schemas.microsoft.com/office/powerpoint/2010/main">
+    <mc:Choice Requires="p14">
       <p:transition spd="slow" p14:dur="3900">
         <p14:glitter pattern="hexagon"/>
       </p:transition>
     </mc:Choice>
-    <mc:Fallback>
+    <mc:Fallback xmlns="">
       <p:transition spd="slow">
         <p:fade/>
       </p:transition>
@@ -25827,13 +25696,13 @@
   <p:clrMapOvr>
     <a:masterClrMapping/>
   </p:clrMapOvr>
-  <mc:AlternateContent xmlns:mc="http://schemas.openxmlformats.org/markup-compatibility/2006">
-    <mc:Choice xmlns:p14="http://schemas.microsoft.com/office/powerpoint/2010/main" Requires="p14">
+  <mc:AlternateContent xmlns:mc="http://schemas.openxmlformats.org/markup-compatibility/2006" xmlns:p14="http://schemas.microsoft.com/office/powerpoint/2010/main">
+    <mc:Choice Requires="p14">
       <p:transition spd="slow" p14:dur="3900">
         <p14:glitter pattern="hexagon"/>
       </p:transition>
     </mc:Choice>
-    <mc:Fallback>
+    <mc:Fallback xmlns="">
       <p:transition spd="slow">
         <p:fade/>
       </p:transition>
@@ -26313,93 +26182,16 @@
           </a:bodyPr>
           <a:lstStyle/>
           <a:p>
-            <a:pPr marL="0" indent="0" algn="just">
-              <a:buNone/>
-            </a:pPr>
-            <a:r>
-              <a:rPr lang="sr-Latn-RS" b="1">
-                <a:cs typeface="Calibri" panose="020F0502020204030204"/>
-              </a:rPr>
-              <a:t>Funkcije:</a:t>
-            </a:r>
-            <a:endParaRPr lang="sr-Latn-RS" b="1" i="1" dirty="0">
-              <a:cs typeface="Calibri" panose="020F0502020204030204"/>
-            </a:endParaRPr>
-          </a:p>
-          <a:p>
-            <a:pPr marL="0" indent="0" algn="just">
-              <a:buNone/>
-            </a:pPr>
-            <a:r>
-              <a:rPr lang="sr-Latn-RS">
-                <a:cs typeface="Calibri" panose="020F0502020204030204"/>
-              </a:rPr>
-              <a:t>- expired</a:t>
-            </a:r>
-            <a:endParaRPr lang="sr-Latn-RS" b="1" dirty="0">
-              <a:cs typeface="Calibri" panose="020F0502020204030204"/>
-            </a:endParaRPr>
-          </a:p>
-          <a:p>
-            <a:pPr marL="0" indent="0" algn="just">
-              <a:buNone/>
-            </a:pPr>
-            <a:r>
-              <a:rPr lang="sr-Latn-RS">
-                <a:cs typeface="Calibri" panose="020F0502020204030204"/>
-              </a:rPr>
-              <a:t>- use_count</a:t>
-            </a:r>
-            <a:endParaRPr lang="sr-Latn-RS" dirty="0">
-              <a:cs typeface="Calibri" panose="020F0502020204030204"/>
-            </a:endParaRPr>
-          </a:p>
-          <a:p>
-            <a:pPr marL="0" indent="0" algn="just">
-              <a:buNone/>
-            </a:pPr>
-            <a:r>
-              <a:rPr lang="sr-Latn-RS">
-                <a:cs typeface="Calibri" panose="020F0502020204030204"/>
-              </a:rPr>
-              <a:t>- reset</a:t>
-            </a:r>
-            <a:endParaRPr lang="sr-Latn-RS" dirty="0">
-              <a:cs typeface="Calibri" panose="020F0502020204030204"/>
-            </a:endParaRPr>
-          </a:p>
-          <a:p>
-            <a:pPr marL="0" indent="0" algn="just">
-              <a:buNone/>
-            </a:pPr>
-            <a:r>
-              <a:rPr lang="sr-Latn-RS">
-                <a:cs typeface="Calibri" panose="020F0502020204030204"/>
-              </a:rPr>
-              <a:t>- swap</a:t>
-            </a:r>
-            <a:endParaRPr lang="sr-Latn-RS" dirty="0">
-              <a:cs typeface="Calibri" panose="020F0502020204030204"/>
-            </a:endParaRPr>
-          </a:p>
-          <a:p>
-            <a:pPr marL="0" indent="0" algn="just">
-              <a:buNone/>
-            </a:pPr>
-            <a:r>
-              <a:rPr lang="sr-Latn-RS">
-                <a:cs typeface="Calibri" panose="020F0502020204030204"/>
-              </a:rPr>
-              <a:t>- lock</a:t>
-            </a:r>
-            <a:endParaRPr lang="sr-Latn-RS" dirty="0">
-              <a:cs typeface="Calibri" panose="020F0502020204030204"/>
-            </a:endParaRPr>
-          </a:p>
-          <a:p>
-            <a:pPr marL="0" indent="0" algn="just">
-              <a:buNone/>
-            </a:pPr>
+            <a:pPr marL="0" indent="0" algn="ctr">
+              <a:buNone/>
+            </a:pPr>
+            <a:r>
+              <a:rPr lang="sr-Latn-RS" b="1" i="1">
+                <a:ea typeface="+mn-lt"/>
+                <a:cs typeface="+mn-lt"/>
+              </a:rPr>
+              <a:t>weak_ptr</a:t>
+            </a:r>
             <a:endParaRPr lang="sr-Latn-RS" b="1" dirty="0">
               <a:ea typeface="+mn-lt"/>
               <a:cs typeface="+mn-lt"/>
@@ -26417,6 +26209,83 @@
             <a:pPr marL="0" indent="0" algn="just">
               <a:buNone/>
             </a:pPr>
+            <a:r>
+              <a:rPr lang="sr-Latn-RS" sz="2000" b="1" i="1" dirty="0">
+                <a:cs typeface="Calibri" panose="020F0502020204030204"/>
+              </a:rPr>
+              <a:t>weak_ptr</a:t>
+            </a:r>
+            <a:r>
+              <a:rPr lang="sr-Latn-RS" sz="2000" dirty="0">
+                <a:cs typeface="Calibri" panose="020F0502020204030204"/>
+              </a:rPr>
+              <a:t> je nastao kao kopija </a:t>
+            </a:r>
+            <a:r>
+              <a:rPr lang="sr-Latn-RS" sz="2000" b="1" i="1" dirty="0">
+                <a:cs typeface="Calibri" panose="020F0502020204030204"/>
+              </a:rPr>
+              <a:t>shared_ptr</a:t>
+            </a:r>
+            <a:r>
+              <a:rPr lang="sr-Latn-RS" sz="2000" dirty="0">
+                <a:cs typeface="Calibri" panose="020F0502020204030204"/>
+              </a:rPr>
+              <a:t>-a. Ovaj tip pokazivača pruža pristup objektu koji je u vlasništvu  jedne ili više instanci </a:t>
+            </a:r>
+            <a:r>
+              <a:rPr lang="sr-Latn-RS" sz="2000" b="1" i="1" dirty="0">
+                <a:cs typeface="Calibri" panose="020F0502020204030204"/>
+              </a:rPr>
+              <a:t>shared_ptr</a:t>
+            </a:r>
+            <a:r>
+              <a:rPr lang="sr-Latn-RS" sz="2000" dirty="0">
+                <a:cs typeface="Calibri" panose="020F0502020204030204"/>
+              </a:rPr>
+              <a:t>, ali ne učestvuje u brojanju referenci. Postojanje ili uništenje </a:t>
+            </a:r>
+            <a:r>
+              <a:rPr lang="sr-Latn-RS" sz="2000" b="1" i="1" dirty="0">
+                <a:cs typeface="Calibri" panose="020F0502020204030204"/>
+              </a:rPr>
+              <a:t>weak_ptr</a:t>
+            </a:r>
+            <a:r>
+              <a:rPr lang="sr-Latn-RS" sz="2000" dirty="0">
+                <a:cs typeface="Calibri" panose="020F0502020204030204"/>
+              </a:rPr>
+              <a:t>-a nema uticaja na </a:t>
+            </a:r>
+            <a:r>
+              <a:rPr lang="sr-Latn-RS" sz="2000" b="1" i="1" dirty="0">
+                <a:cs typeface="Calibri" panose="020F0502020204030204"/>
+              </a:rPr>
+              <a:t>shared_ptr</a:t>
+            </a:r>
+            <a:r>
+              <a:rPr lang="sr-Latn-RS" sz="2000">
+                <a:cs typeface="Calibri" panose="020F0502020204030204"/>
+              </a:rPr>
+              <a:t> ili njegove kopije. Glavni razlog uvođenja </a:t>
+            </a:r>
+            <a:r>
+              <a:rPr lang="sr-Latn-RS" sz="2000" b="1" i="1">
+                <a:cs typeface="Calibri" panose="020F0502020204030204"/>
+              </a:rPr>
+              <a:t>weak_ptr</a:t>
+            </a:r>
+            <a:r>
+              <a:rPr lang="sr-Latn-RS" sz="2000">
+                <a:cs typeface="Calibri" panose="020F0502020204030204"/>
+              </a:rPr>
+              <a:t>-a jeste problem cirkularnih referenci.</a:t>
+            </a:r>
+          </a:p>
+          <a:p>
+            <a:pPr marL="0" indent="0" algn="just">
+              <a:buNone/>
+            </a:pPr>
             <a:endParaRPr lang="sr-Latn-RS" sz="2000" dirty="0">
               <a:cs typeface="Calibri" panose="020F0502020204030204"/>
             </a:endParaRPr>
@@ -26433,6 +26302,14 @@
             <a:pPr marL="0" indent="0" algn="just">
               <a:buNone/>
             </a:pPr>
+            <a:endParaRPr lang="sr-Latn-RS" sz="2000" dirty="0">
+              <a:cs typeface="Calibri" panose="020F0502020204030204"/>
+            </a:endParaRPr>
+          </a:p>
+          <a:p>
+            <a:pPr marL="0" indent="0" algn="just">
+              <a:buNone/>
+            </a:pPr>
             <a:endParaRPr lang="sr-Latn-RS" dirty="0">
               <a:cs typeface="Calibri" panose="020F0502020204030204"/>
             </a:endParaRPr>
@@ -26487,23 +26364,53 @@
           </a:p>
         </p:txBody>
       </p:sp>
+      <p:pic>
+        <p:nvPicPr>
+          <p:cNvPr id="4" name="Slika 4">
+            <a:extLst>
+              <a:ext uri="{FF2B5EF4-FFF2-40B4-BE49-F238E27FC236}">
+                <a16:creationId xmlns:a16="http://schemas.microsoft.com/office/drawing/2014/main" id="{9E8BE601-37A7-4E65-8148-3D32B8CA31F3}"/>
+              </a:ext>
+            </a:extLst>
+          </p:cNvPr>
+          <p:cNvPicPr>
+            <a:picLocks noChangeAspect="1"/>
+          </p:cNvPicPr>
+          <p:nvPr/>
+        </p:nvPicPr>
+        <p:blipFill>
+          <a:blip r:embed="rId2"/>
+          <a:stretch>
+            <a:fillRect/>
+          </a:stretch>
+        </p:blipFill>
+        <p:spPr>
+          <a:xfrm>
+            <a:off x="2220685" y="4024519"/>
+            <a:ext cx="8025008" cy="2178652"/>
+          </a:xfrm>
+          <a:prstGeom prst="rect">
+            <a:avLst/>
+          </a:prstGeom>
+        </p:spPr>
+      </p:pic>
     </p:spTree>
     <p:extLst>
       <p:ext uri="{BB962C8B-B14F-4D97-AF65-F5344CB8AC3E}">
-        <p14:creationId xmlns:p14="http://schemas.microsoft.com/office/powerpoint/2010/main" val="504838357"/>
+        <p14:creationId xmlns:p14="http://schemas.microsoft.com/office/powerpoint/2010/main" val="814342036"/>
       </p:ext>
     </p:extLst>
   </p:cSld>
   <p:clrMapOvr>
     <a:masterClrMapping/>
   </p:clrMapOvr>
-  <mc:AlternateContent xmlns:mc="http://schemas.openxmlformats.org/markup-compatibility/2006">
-    <mc:Choice xmlns:p14="http://schemas.microsoft.com/office/powerpoint/2010/main" Requires="p14">
+  <mc:AlternateContent xmlns:mc="http://schemas.openxmlformats.org/markup-compatibility/2006" xmlns:p14="http://schemas.microsoft.com/office/powerpoint/2010/main">
+    <mc:Choice Requires="p14">
       <p:transition spd="slow" p14:dur="3900">
         <p14:glitter pattern="hexagon"/>
       </p:transition>
     </mc:Choice>
-    <mc:Fallback>
+    <mc:Fallback xmlns="">
       <p:transition spd="slow">
         <p:fade/>
       </p:transition>
@@ -26943,20 +26850,15 @@
           <a:p>
             <a:pPr algn="ctr"/>
             <a:r>
-              <a:rPr lang="sr-Latn-RS" sz="4000">
+              <a:rPr lang="sr-Latn-RS" sz="4000" i="1" dirty="0">
                 <a:solidFill>
                   <a:srgbClr val="FFFFFF"/>
                 </a:solidFill>
                 <a:cs typeface="Calibri Light"/>
               </a:rPr>
-              <a:t>ZAKLJUČAK</a:t>
-            </a:r>
-            <a:endParaRPr lang="sr-Latn-RS" sz="4000" i="1" dirty="0">
-              <a:solidFill>
-                <a:srgbClr val="FFFFFF"/>
-              </a:solidFill>
-              <a:cs typeface="Calibri Light"/>
-            </a:endParaRPr>
+              <a:t>SMART POINTERS</a:t>
+            </a:r>
+            <a:endParaRPr lang="sr-Latn-RS" i="1" dirty="0"/>
           </a:p>
         </p:txBody>
       </p:sp>
@@ -26992,18 +26894,82 @@
               <a:buNone/>
             </a:pPr>
             <a:r>
-              <a:rPr lang="sr-Latn-RS" sz="2400" dirty="0">
-                <a:cs typeface="Calibri" panose="020F0502020204030204"/>
-              </a:rPr>
-              <a:t>Sve ove izmene unapredile su C++ i omogućile da i dalje bude jedan od najpopularnijih jezika. Ove izmene su dosta olakšale programiranje u C++-u što </a:t>
-            </a:r>
-            <a:r>
-              <a:rPr lang="sr-Latn-RS" sz="2400">
-                <a:cs typeface="Calibri" panose="020F0502020204030204"/>
-              </a:rPr>
-              <a:t>će omogućiti tu popularnost među programerima. </a:t>
-            </a:r>
-            <a:endParaRPr lang="sr-Latn-RS" sz="2400" dirty="0">
+              <a:rPr lang="sr-Latn-RS" b="1">
+                <a:cs typeface="Calibri" panose="020F0502020204030204"/>
+              </a:rPr>
+              <a:t>Funkcije:</a:t>
+            </a:r>
+            <a:endParaRPr lang="sr-Latn-RS" b="1" i="1" dirty="0">
+              <a:cs typeface="Calibri" panose="020F0502020204030204"/>
+            </a:endParaRPr>
+          </a:p>
+          <a:p>
+            <a:pPr marL="0" indent="0" algn="just">
+              <a:buNone/>
+            </a:pPr>
+            <a:r>
+              <a:rPr lang="sr-Latn-RS">
+                <a:cs typeface="Calibri" panose="020F0502020204030204"/>
+              </a:rPr>
+              <a:t>- expired</a:t>
+            </a:r>
+            <a:endParaRPr lang="sr-Latn-RS" b="1" dirty="0">
+              <a:cs typeface="Calibri" panose="020F0502020204030204"/>
+            </a:endParaRPr>
+          </a:p>
+          <a:p>
+            <a:pPr marL="0" indent="0" algn="just">
+              <a:buNone/>
+            </a:pPr>
+            <a:r>
+              <a:rPr lang="sr-Latn-RS">
+                <a:cs typeface="Calibri" panose="020F0502020204030204"/>
+              </a:rPr>
+              <a:t>- use_count</a:t>
+            </a:r>
+            <a:endParaRPr lang="sr-Latn-RS" dirty="0">
+              <a:cs typeface="Calibri" panose="020F0502020204030204"/>
+            </a:endParaRPr>
+          </a:p>
+          <a:p>
+            <a:pPr marL="0" indent="0" algn="just">
+              <a:buNone/>
+            </a:pPr>
+            <a:r>
+              <a:rPr lang="sr-Latn-RS">
+                <a:cs typeface="Calibri" panose="020F0502020204030204"/>
+              </a:rPr>
+              <a:t>- reset</a:t>
+            </a:r>
+            <a:endParaRPr lang="sr-Latn-RS" dirty="0">
+              <a:cs typeface="Calibri" panose="020F0502020204030204"/>
+            </a:endParaRPr>
+          </a:p>
+          <a:p>
+            <a:pPr marL="0" indent="0" algn="just">
+              <a:buNone/>
+            </a:pPr>
+            <a:r>
+              <a:rPr lang="sr-Latn-RS">
+                <a:cs typeface="Calibri" panose="020F0502020204030204"/>
+              </a:rPr>
+              <a:t>- swap</a:t>
+            </a:r>
+            <a:endParaRPr lang="sr-Latn-RS" dirty="0">
+              <a:cs typeface="Calibri" panose="020F0502020204030204"/>
+            </a:endParaRPr>
+          </a:p>
+          <a:p>
+            <a:pPr marL="0" indent="0" algn="just">
+              <a:buNone/>
+            </a:pPr>
+            <a:r>
+              <a:rPr lang="sr-Latn-RS">
+                <a:cs typeface="Calibri" panose="020F0502020204030204"/>
+              </a:rPr>
+              <a:t>- lock</a:t>
+            </a:r>
+            <a:endParaRPr lang="sr-Latn-RS" dirty="0">
               <a:cs typeface="Calibri" panose="020F0502020204030204"/>
             </a:endParaRPr>
           </a:p>
@@ -27098,53 +27064,23 @@
           </a:p>
         </p:txBody>
       </p:sp>
-      <p:pic>
-        <p:nvPicPr>
-          <p:cNvPr id="5" name="Slika 5">
-            <a:extLst>
-              <a:ext uri="{FF2B5EF4-FFF2-40B4-BE49-F238E27FC236}">
-                <a16:creationId xmlns:a16="http://schemas.microsoft.com/office/drawing/2014/main" id="{7A31EE27-58C9-4220-8247-E91A2538FA01}"/>
-              </a:ext>
-            </a:extLst>
-          </p:cNvPr>
-          <p:cNvPicPr>
-            <a:picLocks noChangeAspect="1"/>
-          </p:cNvPicPr>
-          <p:nvPr/>
-        </p:nvPicPr>
-        <p:blipFill>
-          <a:blip r:embed="rId2"/>
-          <a:stretch>
-            <a:fillRect/>
-          </a:stretch>
-        </p:blipFill>
-        <p:spPr>
-          <a:xfrm>
-            <a:off x="2835057" y="3184290"/>
-            <a:ext cx="6532323" cy="3109446"/>
-          </a:xfrm>
-          <a:prstGeom prst="rect">
-            <a:avLst/>
-          </a:prstGeom>
-        </p:spPr>
-      </p:pic>
     </p:spTree>
     <p:extLst>
       <p:ext uri="{BB962C8B-B14F-4D97-AF65-F5344CB8AC3E}">
-        <p14:creationId xmlns:p14="http://schemas.microsoft.com/office/powerpoint/2010/main" val="4151001791"/>
+        <p14:creationId xmlns:p14="http://schemas.microsoft.com/office/powerpoint/2010/main" val="504838357"/>
       </p:ext>
     </p:extLst>
   </p:cSld>
   <p:clrMapOvr>
     <a:masterClrMapping/>
   </p:clrMapOvr>
-  <mc:AlternateContent xmlns:mc="http://schemas.openxmlformats.org/markup-compatibility/2006">
-    <mc:Choice xmlns:p14="http://schemas.microsoft.com/office/powerpoint/2010/main" Requires="p14">
+  <mc:AlternateContent xmlns:mc="http://schemas.openxmlformats.org/markup-compatibility/2006" xmlns:p14="http://schemas.microsoft.com/office/powerpoint/2010/main">
+    <mc:Choice Requires="p14">
       <p:transition spd="slow" p14:dur="3900">
         <p14:glitter pattern="hexagon"/>
       </p:transition>
     </mc:Choice>
-    <mc:Fallback>
+    <mc:Fallback xmlns="">
       <p:transition spd="slow">
         <p:fade/>
       </p:transition>
@@ -27178,6 +27114,647 @@
           <a:chExt cx="0" cy="0"/>
         </a:xfrm>
       </p:grpSpPr>
+      <p:sp useBgFill="1">
+        <p:nvSpPr>
+          <p:cNvPr id="8" name="Rectangle 7">
+            <a:extLst>
+              <a:ext uri="{FF2B5EF4-FFF2-40B4-BE49-F238E27FC236}">
+                <a16:creationId xmlns:a16="http://schemas.microsoft.com/office/drawing/2014/main" id="{1B15ED52-F352-441B-82BF-E0EA34836D08}"/>
+              </a:ext>
+              <a:ext uri="{C183D7F6-B498-43B3-948B-1728B52AA6E4}">
+                <adec:decorative xmlns:adec="http://schemas.microsoft.com/office/drawing/2017/decorative" val="1"/>
+              </a:ext>
+            </a:extLst>
+          </p:cNvPr>
+          <p:cNvSpPr>
+            <a:spLocks noGrp="1" noRot="1" noChangeAspect="1" noMove="1" noResize="1" noEditPoints="1" noAdjustHandles="1" noChangeArrowheads="1" noChangeShapeType="1" noTextEdit="1"/>
+          </p:cNvSpPr>
+          <p:nvPr>
+            <p:extLst>
+              <p:ext uri="{386F3935-93C4-4BCD-93E2-E3B085C9AB24}">
+                <p16:designElem xmlns:p16="http://schemas.microsoft.com/office/powerpoint/2015/main" val="1"/>
+              </p:ext>
+            </p:extLst>
+          </p:nvPr>
+        </p:nvSpPr>
+        <p:spPr>
+          <a:xfrm>
+            <a:off x="0" y="0"/>
+            <a:ext cx="12192000" cy="6858000"/>
+          </a:xfrm>
+          <a:prstGeom prst="rect">
+            <a:avLst/>
+          </a:prstGeom>
+          <a:ln w="12700" cap="flat" cmpd="sng" algn="ctr">
+            <a:noFill/>
+            <a:prstDash val="solid"/>
+            <a:miter lim="800000"/>
+          </a:ln>
+          <a:effectLst/>
+          <a:extLst>
+            <a:ext uri="{91240B29-F687-4F45-9708-019B960494DF}">
+              <a14:hiddenLine xmlns:a14="http://schemas.microsoft.com/office/drawing/2010/main" w="12700" cap="flat" cmpd="sng" algn="ctr">
+                <a:solidFill>
+                  <a:schemeClr val="accent1">
+                    <a:shade val="50000"/>
+                  </a:schemeClr>
+                </a:solidFill>
+                <a:prstDash val="solid"/>
+                <a:miter lim="800000"/>
+              </a14:hiddenLine>
+            </a:ext>
+          </a:extLst>
+        </p:spPr>
+        <p:style>
+          <a:lnRef idx="2">
+            <a:schemeClr val="accent1">
+              <a:shade val="50000"/>
+            </a:schemeClr>
+          </a:lnRef>
+          <a:fillRef idx="1">
+            <a:schemeClr val="accent1"/>
+          </a:fillRef>
+          <a:effectRef idx="0">
+            <a:schemeClr val="accent1"/>
+          </a:effectRef>
+          <a:fontRef idx="minor">
+            <a:schemeClr val="lt1"/>
+          </a:fontRef>
+        </p:style>
+        <p:txBody>
+          <a:bodyPr rtlCol="0" anchor="ctr"/>
+          <a:lstStyle/>
+          <a:p>
+            <a:pPr algn="ctr"/>
+            <a:endParaRPr lang="en-US"/>
+          </a:p>
+        </p:txBody>
+      </p:sp>
+      <p:sp>
+        <p:nvSpPr>
+          <p:cNvPr id="10" name="Rectangle 9">
+            <a:extLst>
+              <a:ext uri="{FF2B5EF4-FFF2-40B4-BE49-F238E27FC236}">
+                <a16:creationId xmlns:a16="http://schemas.microsoft.com/office/drawing/2014/main" id="{3B2E3793-BFE6-45A2-9B7B-E18844431C99}"/>
+              </a:ext>
+              <a:ext uri="{C183D7F6-B498-43B3-948B-1728B52AA6E4}">
+                <adec:decorative xmlns:adec="http://schemas.microsoft.com/office/drawing/2017/decorative" val="1"/>
+              </a:ext>
+            </a:extLst>
+          </p:cNvPr>
+          <p:cNvSpPr>
+            <a:spLocks noGrp="1" noRot="1" noChangeAspect="1" noMove="1" noResize="1" noEditPoints="1" noAdjustHandles="1" noChangeArrowheads="1" noChangeShapeType="1" noTextEdit="1"/>
+          </p:cNvSpPr>
+          <p:nvPr>
+            <p:extLst>
+              <p:ext uri="{386F3935-93C4-4BCD-93E2-E3B085C9AB24}">
+                <p16:designElem xmlns:p16="http://schemas.microsoft.com/office/powerpoint/2015/main" val="1"/>
+              </p:ext>
+            </p:extLst>
+          </p:nvPr>
+        </p:nvSpPr>
+        <p:spPr>
+          <a:xfrm flipH="1">
+            <a:off x="-1" y="-1"/>
+            <a:ext cx="12191998" cy="1590742"/>
+          </a:xfrm>
+          <a:prstGeom prst="rect">
+            <a:avLst/>
+          </a:prstGeom>
+          <a:gradFill>
+            <a:gsLst>
+              <a:gs pos="0">
+                <a:srgbClr val="000000"/>
+              </a:gs>
+              <a:gs pos="100000">
+                <a:schemeClr val="accent1">
+                  <a:lumMod val="75000"/>
+                </a:schemeClr>
+              </a:gs>
+            </a:gsLst>
+            <a:lin ang="8400000" scaled="0"/>
+          </a:gradFill>
+          <a:ln>
+            <a:noFill/>
+          </a:ln>
+        </p:spPr>
+        <p:style>
+          <a:lnRef idx="2">
+            <a:schemeClr val="accent1">
+              <a:shade val="50000"/>
+            </a:schemeClr>
+          </a:lnRef>
+          <a:fillRef idx="1">
+            <a:schemeClr val="accent1"/>
+          </a:fillRef>
+          <a:effectRef idx="0">
+            <a:schemeClr val="accent1"/>
+          </a:effectRef>
+          <a:fontRef idx="minor">
+            <a:schemeClr val="lt1"/>
+          </a:fontRef>
+        </p:style>
+        <p:txBody>
+          <a:bodyPr rtlCol="0" anchor="ctr"/>
+          <a:lstStyle/>
+          <a:p>
+            <a:pPr algn="ctr"/>
+            <a:endParaRPr lang="en-US"/>
+          </a:p>
+        </p:txBody>
+      </p:sp>
+      <p:sp>
+        <p:nvSpPr>
+          <p:cNvPr id="12" name="Rectangle 11">
+            <a:extLst>
+              <a:ext uri="{FF2B5EF4-FFF2-40B4-BE49-F238E27FC236}">
+                <a16:creationId xmlns:a16="http://schemas.microsoft.com/office/drawing/2014/main" id="{BC4C4868-CB8F-4AF9-9CDB-8108F2C19B67}"/>
+              </a:ext>
+              <a:ext uri="{C183D7F6-B498-43B3-948B-1728B52AA6E4}">
+                <adec:decorative xmlns:adec="http://schemas.microsoft.com/office/drawing/2017/decorative" val="1"/>
+              </a:ext>
+            </a:extLst>
+          </p:cNvPr>
+          <p:cNvSpPr>
+            <a:spLocks noGrp="1" noRot="1" noChangeAspect="1" noMove="1" noResize="1" noEditPoints="1" noAdjustHandles="1" noChangeArrowheads="1" noChangeShapeType="1" noTextEdit="1"/>
+          </p:cNvSpPr>
+          <p:nvPr>
+            <p:extLst>
+              <p:ext uri="{386F3935-93C4-4BCD-93E2-E3B085C9AB24}">
+                <p16:designElem xmlns:p16="http://schemas.microsoft.com/office/powerpoint/2015/main" val="1"/>
+              </p:ext>
+            </p:extLst>
+          </p:nvPr>
+        </p:nvSpPr>
+        <p:spPr>
+          <a:xfrm rot="10800000" flipH="1">
+            <a:off x="-3" y="0"/>
+            <a:ext cx="8115306" cy="1590742"/>
+          </a:xfrm>
+          <a:prstGeom prst="rect">
+            <a:avLst/>
+          </a:prstGeom>
+          <a:gradFill>
+            <a:gsLst>
+              <a:gs pos="20000">
+                <a:schemeClr val="accent1">
+                  <a:alpha val="0"/>
+                </a:schemeClr>
+              </a:gs>
+              <a:gs pos="100000">
+                <a:schemeClr val="accent1">
+                  <a:lumMod val="50000"/>
+                  <a:alpha val="55000"/>
+                </a:schemeClr>
+              </a:gs>
+            </a:gsLst>
+            <a:lin ang="13800000" scaled="0"/>
+          </a:gradFill>
+          <a:ln>
+            <a:noFill/>
+          </a:ln>
+        </p:spPr>
+        <p:style>
+          <a:lnRef idx="2">
+            <a:schemeClr val="accent1">
+              <a:shade val="50000"/>
+            </a:schemeClr>
+          </a:lnRef>
+          <a:fillRef idx="1">
+            <a:schemeClr val="accent1"/>
+          </a:fillRef>
+          <a:effectRef idx="0">
+            <a:schemeClr val="accent1"/>
+          </a:effectRef>
+          <a:fontRef idx="minor">
+            <a:schemeClr val="lt1"/>
+          </a:fontRef>
+        </p:style>
+        <p:txBody>
+          <a:bodyPr rtlCol="0" anchor="ctr"/>
+          <a:lstStyle/>
+          <a:p>
+            <a:pPr algn="ctr"/>
+            <a:endParaRPr lang="en-US"/>
+          </a:p>
+        </p:txBody>
+      </p:sp>
+      <p:sp>
+        <p:nvSpPr>
+          <p:cNvPr id="14" name="Rectangle 13">
+            <a:extLst>
+              <a:ext uri="{FF2B5EF4-FFF2-40B4-BE49-F238E27FC236}">
+                <a16:creationId xmlns:a16="http://schemas.microsoft.com/office/drawing/2014/main" id="{375E0459-6403-40CD-989D-56A4407CA12E}"/>
+              </a:ext>
+              <a:ext uri="{C183D7F6-B498-43B3-948B-1728B52AA6E4}">
+                <adec:decorative xmlns:adec="http://schemas.microsoft.com/office/drawing/2017/decorative" val="1"/>
+              </a:ext>
+            </a:extLst>
+          </p:cNvPr>
+          <p:cNvSpPr>
+            <a:spLocks noGrp="1" noRot="1" noChangeAspect="1" noMove="1" noResize="1" noEditPoints="1" noAdjustHandles="1" noChangeArrowheads="1" noChangeShapeType="1" noTextEdit="1"/>
+          </p:cNvSpPr>
+          <p:nvPr>
+            <p:extLst>
+              <p:ext uri="{386F3935-93C4-4BCD-93E2-E3B085C9AB24}">
+                <p16:designElem xmlns:p16="http://schemas.microsoft.com/office/powerpoint/2015/main" val="1"/>
+              </p:ext>
+            </p:extLst>
+          </p:nvPr>
+        </p:nvSpPr>
+        <p:spPr>
+          <a:xfrm flipH="1">
+            <a:off x="8115299" y="-1"/>
+            <a:ext cx="4076698" cy="1590742"/>
+          </a:xfrm>
+          <a:prstGeom prst="rect">
+            <a:avLst/>
+          </a:prstGeom>
+          <a:gradFill>
+            <a:gsLst>
+              <a:gs pos="0">
+                <a:schemeClr val="accent1">
+                  <a:alpha val="66000"/>
+                </a:schemeClr>
+              </a:gs>
+              <a:gs pos="100000">
+                <a:srgbClr val="000000">
+                  <a:alpha val="30000"/>
+                </a:srgbClr>
+              </a:gs>
+            </a:gsLst>
+            <a:lin ang="13200000" scaled="0"/>
+          </a:gradFill>
+          <a:ln>
+            <a:noFill/>
+          </a:ln>
+        </p:spPr>
+        <p:style>
+          <a:lnRef idx="2">
+            <a:schemeClr val="accent1">
+              <a:shade val="50000"/>
+            </a:schemeClr>
+          </a:lnRef>
+          <a:fillRef idx="1">
+            <a:schemeClr val="accent1"/>
+          </a:fillRef>
+          <a:effectRef idx="0">
+            <a:schemeClr val="accent1"/>
+          </a:effectRef>
+          <a:fontRef idx="minor">
+            <a:schemeClr val="lt1"/>
+          </a:fontRef>
+        </p:style>
+        <p:txBody>
+          <a:bodyPr rtlCol="0" anchor="ctr"/>
+          <a:lstStyle/>
+          <a:p>
+            <a:pPr algn="ctr"/>
+            <a:endParaRPr lang="en-US"/>
+          </a:p>
+        </p:txBody>
+      </p:sp>
+      <p:sp>
+        <p:nvSpPr>
+          <p:cNvPr id="16" name="Rectangle 15">
+            <a:extLst>
+              <a:ext uri="{FF2B5EF4-FFF2-40B4-BE49-F238E27FC236}">
+                <a16:creationId xmlns:a16="http://schemas.microsoft.com/office/drawing/2014/main" id="{53E5B1A8-3AC9-4BD1-9BBC-78CA94F2D1BA}"/>
+              </a:ext>
+              <a:ext uri="{C183D7F6-B498-43B3-948B-1728B52AA6E4}">
+                <adec:decorative xmlns:adec="http://schemas.microsoft.com/office/drawing/2017/decorative" val="1"/>
+              </a:ext>
+            </a:extLst>
+          </p:cNvPr>
+          <p:cNvSpPr>
+            <a:spLocks noGrp="1" noRot="1" noChangeAspect="1" noMove="1" noResize="1" noEditPoints="1" noAdjustHandles="1" noChangeArrowheads="1" noChangeShapeType="1" noTextEdit="1"/>
+          </p:cNvSpPr>
+          <p:nvPr>
+            <p:extLst>
+              <p:ext uri="{386F3935-93C4-4BCD-93E2-E3B085C9AB24}">
+                <p16:designElem xmlns:p16="http://schemas.microsoft.com/office/powerpoint/2015/main" val="1"/>
+              </p:ext>
+            </p:extLst>
+          </p:nvPr>
+        </p:nvSpPr>
+        <p:spPr>
+          <a:xfrm>
+            <a:off x="459350" y="-1"/>
+            <a:ext cx="11732646" cy="1597433"/>
+          </a:xfrm>
+          <a:prstGeom prst="rect">
+            <a:avLst/>
+          </a:prstGeom>
+          <a:gradFill>
+            <a:gsLst>
+              <a:gs pos="50000">
+                <a:srgbClr val="000000">
+                  <a:alpha val="0"/>
+                </a:srgbClr>
+              </a:gs>
+              <a:gs pos="99000">
+                <a:schemeClr val="accent1">
+                  <a:lumMod val="50000"/>
+                  <a:alpha val="52000"/>
+                </a:schemeClr>
+              </a:gs>
+            </a:gsLst>
+            <a:lin ang="16800000" scaled="0"/>
+          </a:gradFill>
+          <a:ln>
+            <a:noFill/>
+          </a:ln>
+        </p:spPr>
+        <p:style>
+          <a:lnRef idx="2">
+            <a:schemeClr val="accent1">
+              <a:shade val="50000"/>
+            </a:schemeClr>
+          </a:lnRef>
+          <a:fillRef idx="1">
+            <a:schemeClr val="accent1"/>
+          </a:fillRef>
+          <a:effectRef idx="0">
+            <a:schemeClr val="accent1"/>
+          </a:effectRef>
+          <a:fontRef idx="minor">
+            <a:schemeClr val="lt1"/>
+          </a:fontRef>
+        </p:style>
+        <p:txBody>
+          <a:bodyPr rtlCol="0" anchor="ctr"/>
+          <a:lstStyle/>
+          <a:p>
+            <a:pPr algn="ctr"/>
+            <a:endParaRPr lang="en-US"/>
+          </a:p>
+        </p:txBody>
+      </p:sp>
+      <p:sp>
+        <p:nvSpPr>
+          <p:cNvPr id="2" name="Naslov 1">
+            <a:extLst>
+              <a:ext uri="{FF2B5EF4-FFF2-40B4-BE49-F238E27FC236}">
+                <a16:creationId xmlns:a16="http://schemas.microsoft.com/office/drawing/2014/main" id="{E3368B7F-CEF5-4668-AD6B-BD12DB8271EA}"/>
+              </a:ext>
+            </a:extLst>
+          </p:cNvPr>
+          <p:cNvSpPr>
+            <a:spLocks noGrp="1"/>
+          </p:cNvSpPr>
+          <p:nvPr>
+            <p:ph type="title"/>
+          </p:nvPr>
+        </p:nvSpPr>
+        <p:spPr>
+          <a:xfrm>
+            <a:off x="1371599" y="294538"/>
+            <a:ext cx="9895951" cy="1033669"/>
+          </a:xfrm>
+        </p:spPr>
+        <p:txBody>
+          <a:bodyPr>
+            <a:normAutofit/>
+          </a:bodyPr>
+          <a:lstStyle/>
+          <a:p>
+            <a:pPr algn="ctr"/>
+            <a:r>
+              <a:rPr lang="sr-Latn-RS" sz="4000">
+                <a:solidFill>
+                  <a:srgbClr val="FFFFFF"/>
+                </a:solidFill>
+                <a:cs typeface="Calibri Light"/>
+              </a:rPr>
+              <a:t>ZAKLJUČAK</a:t>
+            </a:r>
+            <a:endParaRPr lang="sr-Latn-RS" sz="4000" i="1" dirty="0">
+              <a:solidFill>
+                <a:srgbClr val="FFFFFF"/>
+              </a:solidFill>
+              <a:cs typeface="Calibri Light"/>
+            </a:endParaRPr>
+          </a:p>
+        </p:txBody>
+      </p:sp>
+      <p:sp>
+        <p:nvSpPr>
+          <p:cNvPr id="3" name="Čuvar mesta za sadržaj 2">
+            <a:extLst>
+              <a:ext uri="{FF2B5EF4-FFF2-40B4-BE49-F238E27FC236}">
+                <a16:creationId xmlns:a16="http://schemas.microsoft.com/office/drawing/2014/main" id="{0AD0AB0D-4609-4B24-8824-DE146EA1DEA2}"/>
+              </a:ext>
+            </a:extLst>
+          </p:cNvPr>
+          <p:cNvSpPr>
+            <a:spLocks noGrp="1"/>
+          </p:cNvSpPr>
+          <p:nvPr>
+            <p:ph idx="1"/>
+          </p:nvPr>
+        </p:nvSpPr>
+        <p:spPr>
+          <a:xfrm>
+            <a:off x="940189" y="1758728"/>
+            <a:ext cx="10183319" cy="4539938"/>
+          </a:xfrm>
+        </p:spPr>
+        <p:txBody>
+          <a:bodyPr vert="horz" lIns="91440" tIns="45720" rIns="91440" bIns="45720" rtlCol="0" anchor="t">
+            <a:normAutofit/>
+          </a:bodyPr>
+          <a:lstStyle/>
+          <a:p>
+            <a:pPr marL="0" indent="0" algn="just">
+              <a:buNone/>
+            </a:pPr>
+            <a:r>
+              <a:rPr lang="sr-Latn-RS" sz="2400" dirty="0">
+                <a:cs typeface="Calibri" panose="020F0502020204030204"/>
+              </a:rPr>
+              <a:t>Sve ove izmene unapredile su C++ i omogućile da i dalje bude jedan od najpopularnijih jezika. Ove izmene su dosta olakšale programiranje u C++-u što </a:t>
+            </a:r>
+            <a:r>
+              <a:rPr lang="sr-Latn-RS" sz="2400">
+                <a:cs typeface="Calibri" panose="020F0502020204030204"/>
+              </a:rPr>
+              <a:t>će omogućiti tu popularnost među programerima. </a:t>
+            </a:r>
+            <a:endParaRPr lang="sr-Latn-RS" sz="2400" dirty="0">
+              <a:cs typeface="Calibri" panose="020F0502020204030204"/>
+            </a:endParaRPr>
+          </a:p>
+          <a:p>
+            <a:pPr marL="0" indent="0" algn="just">
+              <a:buNone/>
+            </a:pPr>
+            <a:endParaRPr lang="sr-Latn-RS" b="1" dirty="0">
+              <a:ea typeface="+mn-lt"/>
+              <a:cs typeface="+mn-lt"/>
+            </a:endParaRPr>
+          </a:p>
+          <a:p>
+            <a:pPr marL="0" indent="0" algn="ctr">
+              <a:buNone/>
+            </a:pPr>
+            <a:endParaRPr lang="sr-Latn-RS" sz="2000" b="1" i="1" dirty="0">
+              <a:cs typeface="Calibri" panose="020F0502020204030204"/>
+            </a:endParaRPr>
+          </a:p>
+          <a:p>
+            <a:pPr marL="0" indent="0" algn="just">
+              <a:buNone/>
+            </a:pPr>
+            <a:endParaRPr lang="sr-Latn-RS" sz="2000" dirty="0">
+              <a:cs typeface="Calibri" panose="020F0502020204030204"/>
+            </a:endParaRPr>
+          </a:p>
+          <a:p>
+            <a:pPr marL="0" indent="0" algn="just">
+              <a:buNone/>
+            </a:pPr>
+            <a:endParaRPr lang="sr-Latn-RS" sz="2000" dirty="0">
+              <a:cs typeface="Calibri" panose="020F0502020204030204"/>
+            </a:endParaRPr>
+          </a:p>
+          <a:p>
+            <a:pPr marL="0" indent="0" algn="just">
+              <a:buNone/>
+            </a:pPr>
+            <a:endParaRPr lang="sr-Latn-RS" dirty="0">
+              <a:cs typeface="Calibri" panose="020F0502020204030204"/>
+            </a:endParaRPr>
+          </a:p>
+          <a:p>
+            <a:pPr marL="0" indent="0" algn="just">
+              <a:buNone/>
+            </a:pPr>
+            <a:endParaRPr lang="sr-Latn-RS" b="1" i="1" dirty="0">
+              <a:cs typeface="Calibri" panose="020F0502020204030204"/>
+            </a:endParaRPr>
+          </a:p>
+          <a:p>
+            <a:pPr marL="0" indent="0" algn="ctr">
+              <a:buNone/>
+            </a:pPr>
+            <a:endParaRPr lang="sr-Latn-RS" b="1" i="1" dirty="0">
+              <a:cs typeface="Calibri" panose="020F0502020204030204"/>
+            </a:endParaRPr>
+          </a:p>
+          <a:p>
+            <a:pPr marL="0" indent="0" algn="just">
+              <a:buNone/>
+            </a:pPr>
+            <a:endParaRPr lang="sr-Latn-RS" b="1" dirty="0">
+              <a:cs typeface="Calibri" panose="020F0502020204030204"/>
+            </a:endParaRPr>
+          </a:p>
+          <a:p>
+            <a:pPr marL="0" indent="0" algn="just">
+              <a:buNone/>
+            </a:pPr>
+            <a:endParaRPr lang="sr-Latn-RS" sz="2000" dirty="0">
+              <a:cs typeface="Calibri" panose="020F0502020204030204"/>
+            </a:endParaRPr>
+          </a:p>
+          <a:p>
+            <a:pPr marL="0" indent="0" algn="ctr">
+              <a:buNone/>
+            </a:pPr>
+            <a:endParaRPr lang="sr-Latn-RS" sz="2000" dirty="0">
+              <a:cs typeface="Calibri" panose="020F0502020204030204"/>
+            </a:endParaRPr>
+          </a:p>
+          <a:p>
+            <a:pPr marL="0" indent="0" algn="ctr">
+              <a:buNone/>
+            </a:pPr>
+            <a:endParaRPr lang="sr-Latn-RS" b="1" i="1" dirty="0">
+              <a:cs typeface="Calibri" panose="020F0502020204030204"/>
+            </a:endParaRPr>
+          </a:p>
+        </p:txBody>
+      </p:sp>
+      <p:pic>
+        <p:nvPicPr>
+          <p:cNvPr id="5" name="Slika 5">
+            <a:extLst>
+              <a:ext uri="{FF2B5EF4-FFF2-40B4-BE49-F238E27FC236}">
+                <a16:creationId xmlns:a16="http://schemas.microsoft.com/office/drawing/2014/main" id="{7A31EE27-58C9-4220-8247-E91A2538FA01}"/>
+              </a:ext>
+            </a:extLst>
+          </p:cNvPr>
+          <p:cNvPicPr>
+            <a:picLocks noChangeAspect="1"/>
+          </p:cNvPicPr>
+          <p:nvPr/>
+        </p:nvPicPr>
+        <p:blipFill>
+          <a:blip r:embed="rId2"/>
+          <a:stretch>
+            <a:fillRect/>
+          </a:stretch>
+        </p:blipFill>
+        <p:spPr>
+          <a:xfrm>
+            <a:off x="2835057" y="3184290"/>
+            <a:ext cx="6532323" cy="3109446"/>
+          </a:xfrm>
+          <a:prstGeom prst="rect">
+            <a:avLst/>
+          </a:prstGeom>
+        </p:spPr>
+      </p:pic>
+    </p:spTree>
+    <p:extLst>
+      <p:ext uri="{BB962C8B-B14F-4D97-AF65-F5344CB8AC3E}">
+        <p14:creationId xmlns:p14="http://schemas.microsoft.com/office/powerpoint/2010/main" val="4151001791"/>
+      </p:ext>
+    </p:extLst>
+  </p:cSld>
+  <p:clrMapOvr>
+    <a:masterClrMapping/>
+  </p:clrMapOvr>
+  <mc:AlternateContent xmlns:mc="http://schemas.openxmlformats.org/markup-compatibility/2006" xmlns:p14="http://schemas.microsoft.com/office/powerpoint/2010/main">
+    <mc:Choice Requires="p14">
+      <p:transition spd="slow" p14:dur="3900">
+        <p14:glitter pattern="hexagon"/>
+      </p:transition>
+    </mc:Choice>
+    <mc:Fallback xmlns="">
+      <p:transition spd="slow">
+        <p:fade/>
+      </p:transition>
+    </mc:Fallback>
+  </mc:AlternateContent>
+</p:sld>
+</file>
+
+<file path=ppt/slides/slide43.xml><?xml version="1.0" encoding="utf-8"?>
+<p:sld xmlns:a="http://schemas.openxmlformats.org/drawingml/2006/main" xmlns:r="http://schemas.openxmlformats.org/officeDocument/2006/relationships" xmlns:p="http://schemas.openxmlformats.org/presentationml/2006/main">
+  <p:cSld>
+    <p:bg>
+      <p:bgPr>
+        <a:solidFill>
+          <a:schemeClr val="bg1"/>
+        </a:solidFill>
+        <a:effectLst/>
+      </p:bgPr>
+    </p:bg>
+    <p:spTree>
+      <p:nvGrpSpPr>
+        <p:cNvPr id="1" name=""/>
+        <p:cNvGrpSpPr/>
+        <p:nvPr/>
+      </p:nvGrpSpPr>
+      <p:grpSpPr>
+        <a:xfrm>
+          <a:off x="0" y="0"/>
+          <a:ext cx="0" cy="0"/>
+          <a:chOff x="0" y="0"/>
+          <a:chExt cx="0" cy="0"/>
+        </a:xfrm>
+      </p:grpSpPr>
       <p:pic>
         <p:nvPicPr>
           <p:cNvPr id="15" name="Slika 15">
@@ -27225,13 +27802,13 @@
   <p:clrMapOvr>
     <a:overrideClrMapping bg1="dk1" tx1="lt1" bg2="dk2" tx2="lt2" accent1="accent1" accent2="accent2" accent3="accent3" accent4="accent4" accent5="accent5" accent6="accent6" hlink="hlink" folHlink="folHlink"/>
   </p:clrMapOvr>
-  <mc:AlternateContent xmlns:mc="http://schemas.openxmlformats.org/markup-compatibility/2006">
-    <mc:Choice xmlns:p14="http://schemas.microsoft.com/office/powerpoint/2010/main" Requires="p14">
+  <mc:AlternateContent xmlns:mc="http://schemas.openxmlformats.org/markup-compatibility/2006" xmlns:p14="http://schemas.microsoft.com/office/powerpoint/2010/main">
+    <mc:Choice Requires="p14">
       <p:transition spd="slow" p14:dur="3900">
         <p14:glitter pattern="hexagon"/>
       </p:transition>
     </mc:Choice>
-    <mc:Fallback>
+    <mc:Fallback xmlns="">
       <p:transition spd="slow">
         <p:fade/>
       </p:transition>
@@ -28031,13 +28608,13 @@
   <p:clrMapOvr>
     <a:masterClrMapping/>
   </p:clrMapOvr>
-  <mc:AlternateContent xmlns:mc="http://schemas.openxmlformats.org/markup-compatibility/2006">
-    <mc:Choice xmlns:p14="http://schemas.microsoft.com/office/powerpoint/2010/main" Requires="p14">
+  <mc:AlternateContent xmlns:mc="http://schemas.openxmlformats.org/markup-compatibility/2006" xmlns:p14="http://schemas.microsoft.com/office/powerpoint/2010/main">
+    <mc:Choice Requires="p14">
       <p:transition spd="slow" p14:dur="3900">
         <p14:glitter pattern="hexagon"/>
       </p:transition>
     </mc:Choice>
-    <mc:Fallback>
+    <mc:Fallback xmlns="">
       <p:transition spd="slow">
         <p:fade/>
       </p:transition>
@@ -28608,13 +29185,13 @@
   <p:clrMapOvr>
     <a:masterClrMapping/>
   </p:clrMapOvr>
-  <mc:AlternateContent xmlns:mc="http://schemas.openxmlformats.org/markup-compatibility/2006">
-    <mc:Choice xmlns:p14="http://schemas.microsoft.com/office/powerpoint/2010/main" Requires="p14">
+  <mc:AlternateContent xmlns:mc="http://schemas.openxmlformats.org/markup-compatibility/2006" xmlns:p14="http://schemas.microsoft.com/office/powerpoint/2010/main">
+    <mc:Choice Requires="p14">
       <p:transition spd="slow" p14:dur="3900">
         <p14:glitter pattern="hexagon"/>
       </p:transition>
     </mc:Choice>
-    <mc:Fallback>
+    <mc:Fallback xmlns="">
       <p:transition spd="slow">
         <p:fade/>
       </p:transition>
@@ -29148,13 +29725,13 @@
   <p:clrMapOvr>
     <a:masterClrMapping/>
   </p:clrMapOvr>
-  <mc:AlternateContent xmlns:mc="http://schemas.openxmlformats.org/markup-compatibility/2006">
-    <mc:Choice xmlns:p14="http://schemas.microsoft.com/office/powerpoint/2010/main" Requires="p14">
+  <mc:AlternateContent xmlns:mc="http://schemas.openxmlformats.org/markup-compatibility/2006" xmlns:p14="http://schemas.microsoft.com/office/powerpoint/2010/main">
+    <mc:Choice Requires="p14">
       <p:transition spd="slow" p14:dur="3900">
         <p14:glitter pattern="hexagon"/>
       </p:transition>
     </mc:Choice>
-    <mc:Fallback>
+    <mc:Fallback xmlns="">
       <p:transition spd="slow">
         <p:fade/>
       </p:transition>
@@ -29696,13 +30273,13 @@
   <p:clrMapOvr>
     <a:masterClrMapping/>
   </p:clrMapOvr>
-  <mc:AlternateContent xmlns:mc="http://schemas.openxmlformats.org/markup-compatibility/2006">
-    <mc:Choice xmlns:p14="http://schemas.microsoft.com/office/powerpoint/2010/main" Requires="p14">
+  <mc:AlternateContent xmlns:mc="http://schemas.openxmlformats.org/markup-compatibility/2006" xmlns:p14="http://schemas.microsoft.com/office/powerpoint/2010/main">
+    <mc:Choice Requires="p14">
       <p:transition spd="slow" p14:dur="3900">
         <p14:glitter pattern="hexagon"/>
       </p:transition>
     </mc:Choice>
-    <mc:Fallback>
+    <mc:Fallback xmlns="">
       <p:transition spd="slow">
         <p:fade/>
       </p:transition>
@@ -30316,13 +30893,13 @@
   <p:clrMapOvr>
     <a:masterClrMapping/>
   </p:clrMapOvr>
-  <mc:AlternateContent xmlns:mc="http://schemas.openxmlformats.org/markup-compatibility/2006">
-    <mc:Choice xmlns:p14="http://schemas.microsoft.com/office/powerpoint/2010/main" Requires="p14">
+  <mc:AlternateContent xmlns:mc="http://schemas.openxmlformats.org/markup-compatibility/2006" xmlns:p14="http://schemas.microsoft.com/office/powerpoint/2010/main">
+    <mc:Choice Requires="p14">
       <p:transition spd="slow" p14:dur="3900">
         <p14:glitter pattern="hexagon"/>
       </p:transition>
     </mc:Choice>
-    <mc:Fallback>
+    <mc:Fallback xmlns="">
       <p:transition spd="slow">
         <p:fade/>
       </p:transition>

</xml_diff>